<commit_message>
Add OS Thread and semaphores programming in C
</commit_message>
<xml_diff>
--- a/Bases-de-Datos/Tareas/Normalizacion/diagramas.pptx
+++ b/Bases-de-Datos/Tareas/Normalizacion/diagramas.pptx
@@ -6,6 +6,7 @@
   </p:sldMasterIdLst>
   <p:sldIdLst>
     <p:sldId id="256" r:id="rId2"/>
+    <p:sldId id="257" r:id="rId3"/>
   </p:sldIdLst>
   <p:sldSz cx="12192000" cy="6858000"/>
   <p:notesSz cx="6858000" cy="9144000"/>
@@ -104,6 +105,11 @@
       </a:defRPr>
     </a:lvl9pPr>
   </p:defaultTextStyle>
+  <p:extLst>
+    <p:ext uri="{EFAFB233-063F-42B5-8137-9DF3F51BA10A}">
+      <p15:sldGuideLst xmlns:p15="http://schemas.microsoft.com/office/powerpoint/2012/main"/>
+    </p:ext>
+  </p:extLst>
 </p:presentation>
 </file>
 
@@ -2972,7 +2978,7 @@
         </p:nvSpPr>
         <p:spPr>
           <a:xfrm>
-            <a:off x="1826122" y="1661043"/>
+            <a:off x="328381" y="1264874"/>
             <a:ext cx="1458098" cy="1812324"/>
           </a:xfrm>
           <a:prstGeom prst="rect">
@@ -3018,7 +3024,7 @@
         </p:nvSpPr>
         <p:spPr>
           <a:xfrm>
-            <a:off x="2223598" y="2918342"/>
+            <a:off x="725857" y="2522173"/>
             <a:ext cx="663146" cy="407773"/>
           </a:xfrm>
           <a:prstGeom prst="rect">
@@ -3084,7 +3090,7 @@
         </p:nvSpPr>
         <p:spPr>
           <a:xfrm>
-            <a:off x="2223598" y="2363318"/>
+            <a:off x="725857" y="1967149"/>
             <a:ext cx="663146" cy="407773"/>
           </a:xfrm>
           <a:prstGeom prst="rect">
@@ -3142,7 +3148,7 @@
         </p:nvSpPr>
         <p:spPr>
           <a:xfrm>
-            <a:off x="2223598" y="1808294"/>
+            <a:off x="725857" y="1412125"/>
             <a:ext cx="663146" cy="407773"/>
           </a:xfrm>
           <a:prstGeom prst="rect">
@@ -3208,7 +3214,7 @@
         </p:nvSpPr>
         <p:spPr>
           <a:xfrm>
-            <a:off x="1779348" y="846369"/>
+            <a:off x="281607" y="450200"/>
             <a:ext cx="663146" cy="407773"/>
           </a:xfrm>
           <a:prstGeom prst="rect">
@@ -3274,7 +3280,7 @@
         </p:nvSpPr>
         <p:spPr>
           <a:xfrm>
-            <a:off x="4058859" y="683797"/>
+            <a:off x="2561118" y="287628"/>
             <a:ext cx="982364" cy="407773"/>
           </a:xfrm>
           <a:prstGeom prst="rect">
@@ -3340,7 +3346,7 @@
         </p:nvSpPr>
         <p:spPr>
           <a:xfrm>
-            <a:off x="4190768" y="1199614"/>
+            <a:off x="2693027" y="803445"/>
             <a:ext cx="718546" cy="407773"/>
           </a:xfrm>
           <a:prstGeom prst="rect">
@@ -3409,7 +3415,7 @@
         </p:nvCxnSpPr>
         <p:spPr>
           <a:xfrm rot="16200000" flipV="1">
-            <a:off x="2055970" y="1309093"/>
+            <a:off x="558229" y="912924"/>
             <a:ext cx="554152" cy="444250"/>
           </a:xfrm>
           <a:prstGeom prst="curvedConnector3">
@@ -3450,7 +3456,7 @@
         </p:nvCxnSpPr>
         <p:spPr>
           <a:xfrm flipV="1">
-            <a:off x="2886744" y="887684"/>
+            <a:off x="1389003" y="491515"/>
             <a:ext cx="1172115" cy="1124497"/>
           </a:xfrm>
           <a:prstGeom prst="curvedConnector3">
@@ -3491,7 +3497,7 @@
         </p:nvCxnSpPr>
         <p:spPr>
           <a:xfrm flipV="1">
-            <a:off x="2886744" y="1403501"/>
+            <a:off x="1389003" y="1007332"/>
             <a:ext cx="1304024" cy="608680"/>
           </a:xfrm>
           <a:prstGeom prst="curvedConnector3">
@@ -3527,7 +3533,7 @@
         </p:nvSpPr>
         <p:spPr>
           <a:xfrm>
-            <a:off x="4104603" y="1915609"/>
+            <a:off x="2606862" y="1519440"/>
             <a:ext cx="825638" cy="407773"/>
           </a:xfrm>
           <a:prstGeom prst="rect">
@@ -3593,7 +3599,7 @@
         </p:nvSpPr>
         <p:spPr>
           <a:xfrm>
-            <a:off x="2617007" y="848917"/>
+            <a:off x="1119266" y="452748"/>
             <a:ext cx="825638" cy="407773"/>
           </a:xfrm>
           <a:prstGeom prst="rect">
@@ -3659,7 +3665,7 @@
         </p:nvSpPr>
         <p:spPr>
           <a:xfrm>
-            <a:off x="4058859" y="2490602"/>
+            <a:off x="2561118" y="2094433"/>
             <a:ext cx="877330" cy="407773"/>
           </a:xfrm>
           <a:prstGeom prst="rect">
@@ -3720,7 +3726,7 @@
         </p:nvCxnSpPr>
         <p:spPr>
           <a:xfrm>
-            <a:off x="2886744" y="2567205"/>
+            <a:off x="1389003" y="2171036"/>
             <a:ext cx="1172115" cy="127284"/>
           </a:xfrm>
           <a:prstGeom prst="curvedConnector3">
@@ -3756,7 +3762,7 @@
         </p:nvSpPr>
         <p:spPr>
           <a:xfrm>
-            <a:off x="3884346" y="575753"/>
+            <a:off x="2386605" y="179584"/>
             <a:ext cx="1331390" cy="1124491"/>
           </a:xfrm>
           <a:prstGeom prst="rect">
@@ -3805,7 +3811,7 @@
         </p:nvCxnSpPr>
         <p:spPr>
           <a:xfrm>
-            <a:off x="2886744" y="2012181"/>
+            <a:off x="1389003" y="1616012"/>
             <a:ext cx="1217859" cy="107315"/>
           </a:xfrm>
           <a:prstGeom prst="curvedConnector3">
@@ -3844,7 +3850,7 @@
         </p:nvCxnSpPr>
         <p:spPr>
           <a:xfrm flipH="1">
-            <a:off x="4930241" y="1137999"/>
+            <a:off x="3432500" y="741830"/>
             <a:ext cx="285495" cy="981497"/>
           </a:xfrm>
           <a:prstGeom prst="curvedConnector3">
@@ -3882,7 +3888,7 @@
         </p:nvSpPr>
         <p:spPr>
           <a:xfrm>
-            <a:off x="4052911" y="3065594"/>
+            <a:off x="2555170" y="2669425"/>
             <a:ext cx="877330" cy="407773"/>
           </a:xfrm>
           <a:prstGeom prst="rect">
@@ -3943,7 +3949,7 @@
         </p:nvCxnSpPr>
         <p:spPr>
           <a:xfrm rot="5400000" flipH="1" flipV="1">
-            <a:off x="3202098" y="2622554"/>
+            <a:off x="1704357" y="2226385"/>
             <a:ext cx="203886" cy="1497740"/>
           </a:xfrm>
           <a:prstGeom prst="curvedConnector4">
@@ -3985,7 +3991,7 @@
         </p:nvCxnSpPr>
         <p:spPr>
           <a:xfrm rot="5400000" flipH="1" flipV="1">
-            <a:off x="2516696" y="1295165"/>
+            <a:off x="1018955" y="898996"/>
             <a:ext cx="551604" cy="474655"/>
           </a:xfrm>
           <a:prstGeom prst="curvedConnector3">
@@ -4024,7 +4030,7 @@
         </p:nvCxnSpPr>
         <p:spPr>
           <a:xfrm rot="16200000" flipV="1">
-            <a:off x="2569100" y="388190"/>
+            <a:off x="1071359" y="-7979"/>
             <a:ext cx="2548" cy="918905"/>
           </a:xfrm>
           <a:prstGeom prst="curvedConnector3">
@@ -4397,7 +4403,7 @@
         </p:nvSpPr>
         <p:spPr>
           <a:xfrm>
-            <a:off x="6747661" y="1807564"/>
+            <a:off x="8543510" y="1468318"/>
             <a:ext cx="663146" cy="407773"/>
           </a:xfrm>
           <a:prstGeom prst="rect">
@@ -4463,7 +4469,7 @@
         </p:nvSpPr>
         <p:spPr>
           <a:xfrm>
-            <a:off x="6751398" y="738325"/>
+            <a:off x="8547247" y="399079"/>
             <a:ext cx="663146" cy="407773"/>
           </a:xfrm>
           <a:prstGeom prst="rect">
@@ -4529,7 +4535,7 @@
         </p:nvSpPr>
         <p:spPr>
           <a:xfrm>
-            <a:off x="8896988" y="1233726"/>
+            <a:off x="10692837" y="894480"/>
             <a:ext cx="982364" cy="407773"/>
           </a:xfrm>
           <a:prstGeom prst="rect">
@@ -4595,7 +4601,7 @@
         </p:nvSpPr>
         <p:spPr>
           <a:xfrm>
-            <a:off x="9028897" y="1749543"/>
+            <a:off x="10824746" y="1410297"/>
             <a:ext cx="718546" cy="407773"/>
           </a:xfrm>
           <a:prstGeom prst="rect">
@@ -4664,7 +4670,7 @@
         </p:nvCxnSpPr>
         <p:spPr>
           <a:xfrm rot="5400000" flipH="1" flipV="1">
-            <a:off x="6750369" y="1474963"/>
+            <a:off x="8546218" y="1135717"/>
             <a:ext cx="661466" cy="3737"/>
           </a:xfrm>
           <a:prstGeom prst="curvedConnector3">
@@ -4705,7 +4711,7 @@
         </p:nvCxnSpPr>
         <p:spPr>
           <a:xfrm flipV="1">
-            <a:off x="7410807" y="1437613"/>
+            <a:off x="9206656" y="1098367"/>
             <a:ext cx="1486181" cy="573838"/>
           </a:xfrm>
           <a:prstGeom prst="curvedConnector3">
@@ -4746,7 +4752,7 @@
         </p:nvCxnSpPr>
         <p:spPr>
           <a:xfrm flipV="1">
-            <a:off x="7410807" y="1953430"/>
+            <a:off x="9206656" y="1614184"/>
             <a:ext cx="1618090" cy="58021"/>
           </a:xfrm>
           <a:prstGeom prst="curvedConnector3">
@@ -4782,7 +4788,7 @@
         </p:nvSpPr>
         <p:spPr>
           <a:xfrm>
-            <a:off x="8942732" y="2465538"/>
+            <a:off x="10738581" y="2126292"/>
             <a:ext cx="825638" cy="407773"/>
           </a:xfrm>
           <a:prstGeom prst="rect">
@@ -4848,7 +4854,7 @@
         </p:nvSpPr>
         <p:spPr>
           <a:xfrm>
-            <a:off x="7589057" y="740873"/>
+            <a:off x="9384906" y="401627"/>
             <a:ext cx="825638" cy="407773"/>
           </a:xfrm>
           <a:prstGeom prst="rect">
@@ -4914,7 +4920,7 @@
         </p:nvSpPr>
         <p:spPr>
           <a:xfrm>
-            <a:off x="8722475" y="1125682"/>
+            <a:off x="10518324" y="786436"/>
             <a:ext cx="1331390" cy="1124491"/>
           </a:xfrm>
           <a:prstGeom prst="rect">
@@ -4963,7 +4969,7 @@
         </p:nvCxnSpPr>
         <p:spPr>
           <a:xfrm>
-            <a:off x="7410807" y="2011451"/>
+            <a:off x="9206656" y="1672205"/>
             <a:ext cx="1531925" cy="657974"/>
           </a:xfrm>
           <a:prstGeom prst="curvedConnector3">
@@ -5002,7 +5008,7 @@
         </p:nvCxnSpPr>
         <p:spPr>
           <a:xfrm flipH="1">
-            <a:off x="9768370" y="1687928"/>
+            <a:off x="11564219" y="1348682"/>
             <a:ext cx="285495" cy="981497"/>
           </a:xfrm>
           <a:prstGeom prst="curvedConnector3">
@@ -5043,7 +5049,7 @@
         </p:nvCxnSpPr>
         <p:spPr>
           <a:xfrm rot="5400000" flipH="1" flipV="1">
-            <a:off x="7211096" y="1016784"/>
+            <a:off x="9006945" y="677538"/>
             <a:ext cx="658918" cy="922642"/>
           </a:xfrm>
           <a:prstGeom prst="curvedConnector3">
@@ -5082,12 +5088,855 @@
         </p:nvCxnSpPr>
         <p:spPr>
           <a:xfrm rot="16200000" flipV="1">
-            <a:off x="7541150" y="280146"/>
+            <a:off x="9336999" y="-59100"/>
             <a:ext cx="2548" cy="918905"/>
           </a:xfrm>
           <a:prstGeom prst="curvedConnector3">
             <a:avLst>
               <a:gd name="adj1" fmla="val 9071743"/>
+            </a:avLst>
+          </a:prstGeom>
+          <a:ln w="12700">
+            <a:solidFill>
+              <a:schemeClr val="tx1"/>
+            </a:solidFill>
+            <a:tailEnd type="triangle"/>
+          </a:ln>
+        </p:spPr>
+        <p:style>
+          <a:lnRef idx="1">
+            <a:schemeClr val="accent1"/>
+          </a:lnRef>
+          <a:fillRef idx="0">
+            <a:schemeClr val="accent1"/>
+          </a:fillRef>
+          <a:effectRef idx="0">
+            <a:schemeClr val="accent1"/>
+          </a:effectRef>
+          <a:fontRef idx="minor">
+            <a:schemeClr val="tx1"/>
+          </a:fontRef>
+        </p:style>
+      </p:cxnSp>
+      <p:sp>
+        <p:nvSpPr>
+          <p:cNvPr id="44" name="Rectángulo 43"/>
+          <p:cNvSpPr/>
+          <p:nvPr/>
+        </p:nvSpPr>
+        <p:spPr>
+          <a:xfrm>
+            <a:off x="9491175" y="5363445"/>
+            <a:ext cx="663146" cy="407773"/>
+          </a:xfrm>
+          <a:prstGeom prst="rect">
+            <a:avLst/>
+          </a:prstGeom>
+          <a:noFill/>
+          <a:ln w="38100">
+            <a:solidFill>
+              <a:schemeClr val="tx1"/>
+            </a:solidFill>
+          </a:ln>
+        </p:spPr>
+        <p:style>
+          <a:lnRef idx="2">
+            <a:schemeClr val="accent1">
+              <a:shade val="50000"/>
+            </a:schemeClr>
+          </a:lnRef>
+          <a:fillRef idx="1">
+            <a:schemeClr val="accent1"/>
+          </a:fillRef>
+          <a:effectRef idx="0">
+            <a:schemeClr val="accent1"/>
+          </a:effectRef>
+          <a:fontRef idx="minor">
+            <a:schemeClr val="lt1"/>
+          </a:fontRef>
+        </p:style>
+        <p:txBody>
+          <a:bodyPr rtlCol="0" anchor="ctr"/>
+          <a:lstStyle/>
+          <a:p>
+            <a:pPr algn="ctr"/>
+            <a:r>
+              <a:rPr lang="es-VE" sz="1400" dirty="0">
+                <a:solidFill>
+                  <a:schemeClr val="tx1"/>
+                </a:solidFill>
+              </a:rPr>
+              <a:t>v</a:t>
+            </a:r>
+            <a:r>
+              <a:rPr lang="es-VE" sz="1400" dirty="0" smtClean="0">
+                <a:solidFill>
+                  <a:schemeClr val="tx1"/>
+                </a:solidFill>
+              </a:rPr>
+              <a:t>#</a:t>
+            </a:r>
+            <a:endParaRPr lang="es-VE" sz="1400" dirty="0">
+              <a:solidFill>
+                <a:schemeClr val="tx1"/>
+              </a:solidFill>
+            </a:endParaRPr>
+          </a:p>
+        </p:txBody>
+      </p:sp>
+      <p:sp>
+        <p:nvSpPr>
+          <p:cNvPr id="46" name="Rectángulo 45"/>
+          <p:cNvSpPr/>
+          <p:nvPr/>
+        </p:nvSpPr>
+        <p:spPr>
+          <a:xfrm>
+            <a:off x="10738581" y="4806939"/>
+            <a:ext cx="982364" cy="407773"/>
+          </a:xfrm>
+          <a:prstGeom prst="rect">
+            <a:avLst/>
+          </a:prstGeom>
+          <a:noFill/>
+          <a:ln w="38100">
+            <a:solidFill>
+              <a:schemeClr val="tx1"/>
+            </a:solidFill>
+          </a:ln>
+        </p:spPr>
+        <p:style>
+          <a:lnRef idx="2">
+            <a:schemeClr val="accent1">
+              <a:shade val="50000"/>
+            </a:schemeClr>
+          </a:lnRef>
+          <a:fillRef idx="1">
+            <a:schemeClr val="accent1"/>
+          </a:fillRef>
+          <a:effectRef idx="0">
+            <a:schemeClr val="accent1"/>
+          </a:effectRef>
+          <a:fontRef idx="minor">
+            <a:schemeClr val="lt1"/>
+          </a:fontRef>
+        </p:style>
+        <p:txBody>
+          <a:bodyPr rtlCol="0" anchor="ctr"/>
+          <a:lstStyle/>
+          <a:p>
+            <a:pPr algn="ctr"/>
+            <a:r>
+              <a:rPr lang="es-VE" sz="1400" dirty="0">
+                <a:solidFill>
+                  <a:schemeClr val="tx1"/>
+                </a:solidFill>
+              </a:rPr>
+              <a:t>s</a:t>
+            </a:r>
+            <a:r>
+              <a:rPr lang="es-VE" sz="1400" dirty="0" smtClean="0">
+                <a:solidFill>
+                  <a:schemeClr val="tx1"/>
+                </a:solidFill>
+              </a:rPr>
+              <a:t>embradío</a:t>
+            </a:r>
+            <a:endParaRPr lang="es-VE" sz="1400" dirty="0">
+              <a:solidFill>
+                <a:schemeClr val="tx1"/>
+              </a:solidFill>
+            </a:endParaRPr>
+          </a:p>
+        </p:txBody>
+      </p:sp>
+      <p:sp>
+        <p:nvSpPr>
+          <p:cNvPr id="47" name="Rectángulo 46"/>
+          <p:cNvSpPr/>
+          <p:nvPr/>
+        </p:nvSpPr>
+        <p:spPr>
+          <a:xfrm>
+            <a:off x="10738581" y="5363445"/>
+            <a:ext cx="718546" cy="407773"/>
+          </a:xfrm>
+          <a:prstGeom prst="rect">
+            <a:avLst/>
+          </a:prstGeom>
+          <a:noFill/>
+          <a:ln w="38100">
+            <a:solidFill>
+              <a:schemeClr val="tx1"/>
+            </a:solidFill>
+          </a:ln>
+        </p:spPr>
+        <p:style>
+          <a:lnRef idx="2">
+            <a:schemeClr val="accent1">
+              <a:shade val="50000"/>
+            </a:schemeClr>
+          </a:lnRef>
+          <a:fillRef idx="1">
+            <a:schemeClr val="accent1"/>
+          </a:fillRef>
+          <a:effectRef idx="0">
+            <a:schemeClr val="accent1"/>
+          </a:effectRef>
+          <a:fontRef idx="minor">
+            <a:schemeClr val="lt1"/>
+          </a:fontRef>
+        </p:style>
+        <p:txBody>
+          <a:bodyPr rtlCol="0" anchor="ctr"/>
+          <a:lstStyle/>
+          <a:p>
+            <a:pPr algn="ctr"/>
+            <a:r>
+              <a:rPr lang="es-VE" sz="1400" dirty="0">
+                <a:solidFill>
+                  <a:schemeClr val="tx1"/>
+                </a:solidFill>
+              </a:rPr>
+              <a:t>a</a:t>
+            </a:r>
+            <a:r>
+              <a:rPr lang="es-VE" sz="1400" dirty="0" smtClean="0">
+                <a:solidFill>
+                  <a:schemeClr val="tx1"/>
+                </a:solidFill>
+              </a:rPr>
+              <a:t>ño</a:t>
+            </a:r>
+            <a:endParaRPr lang="es-VE" sz="1400" dirty="0">
+              <a:solidFill>
+                <a:schemeClr val="tx1"/>
+              </a:solidFill>
+            </a:endParaRPr>
+          </a:p>
+        </p:txBody>
+      </p:sp>
+      <p:cxnSp>
+        <p:nvCxnSpPr>
+          <p:cNvPr id="50" name="Conector curvado 49"/>
+          <p:cNvCxnSpPr>
+            <a:stCxn id="44" idx="3"/>
+            <a:endCxn id="46" idx="1"/>
+          </p:cNvCxnSpPr>
+          <p:nvPr/>
+        </p:nvCxnSpPr>
+        <p:spPr>
+          <a:xfrm flipV="1">
+            <a:off x="10154321" y="5010826"/>
+            <a:ext cx="584260" cy="556506"/>
+          </a:xfrm>
+          <a:prstGeom prst="curvedConnector3">
+            <a:avLst>
+              <a:gd name="adj1" fmla="val 50000"/>
+            </a:avLst>
+          </a:prstGeom>
+          <a:ln w="12700">
+            <a:solidFill>
+              <a:schemeClr val="tx1"/>
+            </a:solidFill>
+            <a:tailEnd type="triangle"/>
+          </a:ln>
+        </p:spPr>
+        <p:style>
+          <a:lnRef idx="1">
+            <a:schemeClr val="accent1"/>
+          </a:lnRef>
+          <a:fillRef idx="0">
+            <a:schemeClr val="accent1"/>
+          </a:fillRef>
+          <a:effectRef idx="0">
+            <a:schemeClr val="accent1"/>
+          </a:effectRef>
+          <a:fontRef idx="minor">
+            <a:schemeClr val="tx1"/>
+          </a:fontRef>
+        </p:style>
+      </p:cxnSp>
+      <p:cxnSp>
+        <p:nvCxnSpPr>
+          <p:cNvPr id="51" name="Conector curvado 50"/>
+          <p:cNvCxnSpPr>
+            <a:stCxn id="44" idx="3"/>
+            <a:endCxn id="47" idx="1"/>
+          </p:cNvCxnSpPr>
+          <p:nvPr/>
+        </p:nvCxnSpPr>
+        <p:spPr>
+          <a:xfrm>
+            <a:off x="10154321" y="5567332"/>
+            <a:ext cx="584260" cy="12700"/>
+          </a:xfrm>
+          <a:prstGeom prst="curvedConnector3">
+            <a:avLst/>
+          </a:prstGeom>
+          <a:ln w="12700">
+            <a:solidFill>
+              <a:schemeClr val="tx1"/>
+            </a:solidFill>
+            <a:tailEnd type="triangle"/>
+          </a:ln>
+        </p:spPr>
+        <p:style>
+          <a:lnRef idx="1">
+            <a:schemeClr val="accent1"/>
+          </a:lnRef>
+          <a:fillRef idx="0">
+            <a:schemeClr val="accent1"/>
+          </a:fillRef>
+          <a:effectRef idx="0">
+            <a:schemeClr val="accent1"/>
+          </a:effectRef>
+          <a:fontRef idx="minor">
+            <a:schemeClr val="tx1"/>
+          </a:fontRef>
+        </p:style>
+      </p:cxnSp>
+      <p:sp>
+        <p:nvSpPr>
+          <p:cNvPr id="53" name="Rectángulo 52"/>
+          <p:cNvSpPr/>
+          <p:nvPr/>
+        </p:nvSpPr>
+        <p:spPr>
+          <a:xfrm>
+            <a:off x="10738581" y="5919951"/>
+            <a:ext cx="825638" cy="407773"/>
+          </a:xfrm>
+          <a:prstGeom prst="rect">
+            <a:avLst/>
+          </a:prstGeom>
+          <a:noFill/>
+          <a:ln w="38100">
+            <a:solidFill>
+              <a:schemeClr val="tx1"/>
+            </a:solidFill>
+          </a:ln>
+        </p:spPr>
+        <p:style>
+          <a:lnRef idx="2">
+            <a:schemeClr val="accent1">
+              <a:shade val="50000"/>
+            </a:schemeClr>
+          </a:lnRef>
+          <a:fillRef idx="1">
+            <a:schemeClr val="accent1"/>
+          </a:fillRef>
+          <a:effectRef idx="0">
+            <a:schemeClr val="accent1"/>
+          </a:effectRef>
+          <a:fontRef idx="minor">
+            <a:schemeClr val="lt1"/>
+          </a:fontRef>
+        </p:style>
+        <p:txBody>
+          <a:bodyPr rtlCol="0" anchor="ctr"/>
+          <a:lstStyle/>
+          <a:p>
+            <a:pPr algn="ctr"/>
+            <a:r>
+              <a:rPr lang="es-VE" sz="1400" dirty="0">
+                <a:solidFill>
+                  <a:schemeClr val="tx1"/>
+                </a:solidFill>
+              </a:rPr>
+              <a:t>r</a:t>
+            </a:r>
+            <a:r>
+              <a:rPr lang="es-VE" sz="1400" dirty="0" smtClean="0">
+                <a:solidFill>
+                  <a:schemeClr val="tx1"/>
+                </a:solidFill>
+              </a:rPr>
+              <a:t>egión</a:t>
+            </a:r>
+            <a:endParaRPr lang="es-VE" sz="1400" dirty="0">
+              <a:solidFill>
+                <a:schemeClr val="tx1"/>
+              </a:solidFill>
+            </a:endParaRPr>
+          </a:p>
+        </p:txBody>
+      </p:sp>
+      <p:cxnSp>
+        <p:nvCxnSpPr>
+          <p:cNvPr id="57" name="Conector curvado 56"/>
+          <p:cNvCxnSpPr>
+            <a:stCxn id="44" idx="3"/>
+            <a:endCxn id="53" idx="1"/>
+          </p:cNvCxnSpPr>
+          <p:nvPr/>
+        </p:nvCxnSpPr>
+        <p:spPr>
+          <a:xfrm>
+            <a:off x="10154321" y="5567332"/>
+            <a:ext cx="584260" cy="556506"/>
+          </a:xfrm>
+          <a:prstGeom prst="curvedConnector3">
+            <a:avLst>
+              <a:gd name="adj1" fmla="val 50000"/>
+            </a:avLst>
+          </a:prstGeom>
+          <a:ln w="12700">
+            <a:solidFill>
+              <a:schemeClr val="tx1"/>
+            </a:solidFill>
+            <a:tailEnd type="triangle"/>
+          </a:ln>
+        </p:spPr>
+        <p:style>
+          <a:lnRef idx="1">
+            <a:schemeClr val="accent1"/>
+          </a:lnRef>
+          <a:fillRef idx="0">
+            <a:schemeClr val="accent1"/>
+          </a:fillRef>
+          <a:effectRef idx="0">
+            <a:schemeClr val="accent1"/>
+          </a:effectRef>
+          <a:fontRef idx="minor">
+            <a:schemeClr val="tx1"/>
+          </a:fontRef>
+        </p:style>
+      </p:cxnSp>
+      <p:sp>
+        <p:nvSpPr>
+          <p:cNvPr id="75" name="Rectángulo 74"/>
+          <p:cNvSpPr/>
+          <p:nvPr/>
+        </p:nvSpPr>
+        <p:spPr>
+          <a:xfrm>
+            <a:off x="4223527" y="5573055"/>
+            <a:ext cx="982364" cy="407773"/>
+          </a:xfrm>
+          <a:prstGeom prst="rect">
+            <a:avLst/>
+          </a:prstGeom>
+          <a:noFill/>
+          <a:ln w="38100">
+            <a:solidFill>
+              <a:schemeClr val="tx1"/>
+            </a:solidFill>
+          </a:ln>
+        </p:spPr>
+        <p:style>
+          <a:lnRef idx="2">
+            <a:schemeClr val="accent1">
+              <a:shade val="50000"/>
+            </a:schemeClr>
+          </a:lnRef>
+          <a:fillRef idx="1">
+            <a:schemeClr val="accent1"/>
+          </a:fillRef>
+          <a:effectRef idx="0">
+            <a:schemeClr val="accent1"/>
+          </a:effectRef>
+          <a:fontRef idx="minor">
+            <a:schemeClr val="lt1"/>
+          </a:fontRef>
+        </p:style>
+        <p:txBody>
+          <a:bodyPr rtlCol="0" anchor="ctr"/>
+          <a:lstStyle/>
+          <a:p>
+            <a:pPr algn="ctr"/>
+            <a:r>
+              <a:rPr lang="es-VE" sz="1400" dirty="0">
+                <a:solidFill>
+                  <a:schemeClr val="tx1"/>
+                </a:solidFill>
+              </a:rPr>
+              <a:t>s</a:t>
+            </a:r>
+            <a:r>
+              <a:rPr lang="es-VE" sz="1400" dirty="0" smtClean="0">
+                <a:solidFill>
+                  <a:schemeClr val="tx1"/>
+                </a:solidFill>
+              </a:rPr>
+              <a:t>embradío</a:t>
+            </a:r>
+            <a:endParaRPr lang="es-VE" sz="1400" dirty="0">
+              <a:solidFill>
+                <a:schemeClr val="tx1"/>
+              </a:solidFill>
+            </a:endParaRPr>
+          </a:p>
+        </p:txBody>
+      </p:sp>
+      <p:sp>
+        <p:nvSpPr>
+          <p:cNvPr id="76" name="Rectángulo 75"/>
+          <p:cNvSpPr/>
+          <p:nvPr/>
+        </p:nvSpPr>
+        <p:spPr>
+          <a:xfrm>
+            <a:off x="4355436" y="6088872"/>
+            <a:ext cx="718546" cy="407773"/>
+          </a:xfrm>
+          <a:prstGeom prst="rect">
+            <a:avLst/>
+          </a:prstGeom>
+          <a:noFill/>
+          <a:ln w="38100">
+            <a:solidFill>
+              <a:schemeClr val="tx1"/>
+            </a:solidFill>
+          </a:ln>
+        </p:spPr>
+        <p:style>
+          <a:lnRef idx="2">
+            <a:schemeClr val="accent1">
+              <a:shade val="50000"/>
+            </a:schemeClr>
+          </a:lnRef>
+          <a:fillRef idx="1">
+            <a:schemeClr val="accent1"/>
+          </a:fillRef>
+          <a:effectRef idx="0">
+            <a:schemeClr val="accent1"/>
+          </a:effectRef>
+          <a:fontRef idx="minor">
+            <a:schemeClr val="lt1"/>
+          </a:fontRef>
+        </p:style>
+        <p:txBody>
+          <a:bodyPr rtlCol="0" anchor="ctr"/>
+          <a:lstStyle/>
+          <a:p>
+            <a:pPr algn="ctr"/>
+            <a:r>
+              <a:rPr lang="es-VE" sz="1400" dirty="0">
+                <a:solidFill>
+                  <a:schemeClr val="tx1"/>
+                </a:solidFill>
+              </a:rPr>
+              <a:t>a</a:t>
+            </a:r>
+            <a:r>
+              <a:rPr lang="es-VE" sz="1400" dirty="0" smtClean="0">
+                <a:solidFill>
+                  <a:schemeClr val="tx1"/>
+                </a:solidFill>
+              </a:rPr>
+              <a:t>ño</a:t>
+            </a:r>
+            <a:endParaRPr lang="es-VE" sz="1400" dirty="0">
+              <a:solidFill>
+                <a:schemeClr val="tx1"/>
+              </a:solidFill>
+            </a:endParaRPr>
+          </a:p>
+        </p:txBody>
+      </p:sp>
+      <p:sp>
+        <p:nvSpPr>
+          <p:cNvPr id="77" name="Rectángulo 76"/>
+          <p:cNvSpPr/>
+          <p:nvPr/>
+        </p:nvSpPr>
+        <p:spPr>
+          <a:xfrm>
+            <a:off x="5686826" y="5823369"/>
+            <a:ext cx="825638" cy="407773"/>
+          </a:xfrm>
+          <a:prstGeom prst="rect">
+            <a:avLst/>
+          </a:prstGeom>
+          <a:noFill/>
+          <a:ln w="38100">
+            <a:solidFill>
+              <a:schemeClr val="tx1"/>
+            </a:solidFill>
+          </a:ln>
+        </p:spPr>
+        <p:style>
+          <a:lnRef idx="2">
+            <a:schemeClr val="accent1">
+              <a:shade val="50000"/>
+            </a:schemeClr>
+          </a:lnRef>
+          <a:fillRef idx="1">
+            <a:schemeClr val="accent1"/>
+          </a:fillRef>
+          <a:effectRef idx="0">
+            <a:schemeClr val="accent1"/>
+          </a:effectRef>
+          <a:fontRef idx="minor">
+            <a:schemeClr val="lt1"/>
+          </a:fontRef>
+        </p:style>
+        <p:txBody>
+          <a:bodyPr rtlCol="0" anchor="ctr"/>
+          <a:lstStyle/>
+          <a:p>
+            <a:pPr algn="ctr"/>
+            <a:r>
+              <a:rPr lang="es-VE" sz="1400" dirty="0">
+                <a:solidFill>
+                  <a:schemeClr val="tx1"/>
+                </a:solidFill>
+              </a:rPr>
+              <a:t>c</a:t>
+            </a:r>
+            <a:r>
+              <a:rPr lang="es-VE" sz="1400" dirty="0" smtClean="0">
+                <a:solidFill>
+                  <a:schemeClr val="tx1"/>
+                </a:solidFill>
+              </a:rPr>
+              <a:t>alidad</a:t>
+            </a:r>
+            <a:endParaRPr lang="es-VE" sz="1400" dirty="0">
+              <a:solidFill>
+                <a:schemeClr val="tx1"/>
+              </a:solidFill>
+            </a:endParaRPr>
+          </a:p>
+        </p:txBody>
+      </p:sp>
+      <p:sp>
+        <p:nvSpPr>
+          <p:cNvPr id="78" name="Rectángulo 77"/>
+          <p:cNvSpPr/>
+          <p:nvPr/>
+        </p:nvSpPr>
+        <p:spPr>
+          <a:xfrm>
+            <a:off x="4049014" y="5465011"/>
+            <a:ext cx="1331390" cy="1124491"/>
+          </a:xfrm>
+          <a:prstGeom prst="rect">
+            <a:avLst/>
+          </a:prstGeom>
+          <a:noFill/>
+          <a:ln w="19050">
+            <a:solidFill>
+              <a:schemeClr val="tx1"/>
+            </a:solidFill>
+          </a:ln>
+        </p:spPr>
+        <p:style>
+          <a:lnRef idx="2">
+            <a:schemeClr val="accent1">
+              <a:shade val="50000"/>
+            </a:schemeClr>
+          </a:lnRef>
+          <a:fillRef idx="1">
+            <a:schemeClr val="accent1"/>
+          </a:fillRef>
+          <a:effectRef idx="0">
+            <a:schemeClr val="accent1"/>
+          </a:effectRef>
+          <a:fontRef idx="minor">
+            <a:schemeClr val="lt1"/>
+          </a:fontRef>
+        </p:style>
+        <p:txBody>
+          <a:bodyPr rtlCol="0" anchor="ctr"/>
+          <a:lstStyle/>
+          <a:p>
+            <a:pPr algn="ctr"/>
+            <a:endParaRPr lang="es-VE"/>
+          </a:p>
+        </p:txBody>
+      </p:sp>
+      <p:cxnSp>
+        <p:nvCxnSpPr>
+          <p:cNvPr id="79" name="Conector curvado 78"/>
+          <p:cNvCxnSpPr>
+            <a:stCxn id="78" idx="3"/>
+            <a:endCxn id="77" idx="1"/>
+          </p:cNvCxnSpPr>
+          <p:nvPr/>
+        </p:nvCxnSpPr>
+        <p:spPr>
+          <a:xfrm flipV="1">
+            <a:off x="5380404" y="6027256"/>
+            <a:ext cx="306422" cy="1"/>
+          </a:xfrm>
+          <a:prstGeom prst="curvedConnector3">
+            <a:avLst>
+              <a:gd name="adj1" fmla="val 50000"/>
+            </a:avLst>
+          </a:prstGeom>
+          <a:ln w="12700">
+            <a:solidFill>
+              <a:schemeClr val="tx1"/>
+            </a:solidFill>
+            <a:tailEnd type="triangle"/>
+          </a:ln>
+        </p:spPr>
+        <p:style>
+          <a:lnRef idx="1">
+            <a:schemeClr val="accent1"/>
+          </a:lnRef>
+          <a:fillRef idx="0">
+            <a:schemeClr val="accent1"/>
+          </a:fillRef>
+          <a:effectRef idx="0">
+            <a:schemeClr val="accent1"/>
+          </a:effectRef>
+          <a:fontRef idx="minor">
+            <a:schemeClr val="tx1"/>
+          </a:fontRef>
+        </p:style>
+      </p:cxnSp>
+      <p:sp>
+        <p:nvSpPr>
+          <p:cNvPr id="83" name="Rectángulo 82"/>
+          <p:cNvSpPr/>
+          <p:nvPr/>
+        </p:nvSpPr>
+        <p:spPr>
+          <a:xfrm>
+            <a:off x="4849167" y="3937230"/>
+            <a:ext cx="663146" cy="407773"/>
+          </a:xfrm>
+          <a:prstGeom prst="rect">
+            <a:avLst/>
+          </a:prstGeom>
+          <a:noFill/>
+          <a:ln w="38100">
+            <a:solidFill>
+              <a:schemeClr val="tx1"/>
+            </a:solidFill>
+          </a:ln>
+        </p:spPr>
+        <p:style>
+          <a:lnRef idx="2">
+            <a:schemeClr val="accent1">
+              <a:shade val="50000"/>
+            </a:schemeClr>
+          </a:lnRef>
+          <a:fillRef idx="1">
+            <a:schemeClr val="accent1"/>
+          </a:fillRef>
+          <a:effectRef idx="0">
+            <a:schemeClr val="accent1"/>
+          </a:effectRef>
+          <a:fontRef idx="minor">
+            <a:schemeClr val="lt1"/>
+          </a:fontRef>
+        </p:style>
+        <p:txBody>
+          <a:bodyPr rtlCol="0" anchor="ctr"/>
+          <a:lstStyle/>
+          <a:p>
+            <a:pPr algn="ctr"/>
+            <a:r>
+              <a:rPr lang="es-VE" sz="1400" dirty="0">
+                <a:solidFill>
+                  <a:schemeClr val="tx1"/>
+                </a:solidFill>
+              </a:rPr>
+              <a:t>p</a:t>
+            </a:r>
+            <a:r>
+              <a:rPr lang="es-VE" sz="1400" dirty="0" smtClean="0">
+                <a:solidFill>
+                  <a:schemeClr val="tx1"/>
+                </a:solidFill>
+              </a:rPr>
+              <a:t>aís</a:t>
+            </a:r>
+            <a:endParaRPr lang="es-VE" sz="1400" dirty="0">
+              <a:solidFill>
+                <a:schemeClr val="tx1"/>
+              </a:solidFill>
+            </a:endParaRPr>
+          </a:p>
+        </p:txBody>
+      </p:sp>
+      <p:sp>
+        <p:nvSpPr>
+          <p:cNvPr id="84" name="Rectángulo 83"/>
+          <p:cNvSpPr/>
+          <p:nvPr/>
+        </p:nvSpPr>
+        <p:spPr>
+          <a:xfrm>
+            <a:off x="3717995" y="3937230"/>
+            <a:ext cx="825638" cy="407773"/>
+          </a:xfrm>
+          <a:prstGeom prst="rect">
+            <a:avLst/>
+          </a:prstGeom>
+          <a:noFill/>
+          <a:ln w="38100">
+            <a:solidFill>
+              <a:schemeClr val="tx1"/>
+            </a:solidFill>
+          </a:ln>
+        </p:spPr>
+        <p:style>
+          <a:lnRef idx="2">
+            <a:schemeClr val="accent1">
+              <a:shade val="50000"/>
+            </a:schemeClr>
+          </a:lnRef>
+          <a:fillRef idx="1">
+            <a:schemeClr val="accent1"/>
+          </a:fillRef>
+          <a:effectRef idx="0">
+            <a:schemeClr val="accent1"/>
+          </a:effectRef>
+          <a:fontRef idx="minor">
+            <a:schemeClr val="lt1"/>
+          </a:fontRef>
+        </p:style>
+        <p:txBody>
+          <a:bodyPr rtlCol="0" anchor="ctr"/>
+          <a:lstStyle/>
+          <a:p>
+            <a:pPr algn="ctr"/>
+            <a:r>
+              <a:rPr lang="es-VE" sz="1400" dirty="0">
+                <a:solidFill>
+                  <a:schemeClr val="tx1"/>
+                </a:solidFill>
+              </a:rPr>
+              <a:t>r</a:t>
+            </a:r>
+            <a:r>
+              <a:rPr lang="es-VE" sz="1400" dirty="0" smtClean="0">
+                <a:solidFill>
+                  <a:schemeClr val="tx1"/>
+                </a:solidFill>
+              </a:rPr>
+              <a:t>egión</a:t>
+            </a:r>
+            <a:endParaRPr lang="es-VE" sz="1400" dirty="0">
+              <a:solidFill>
+                <a:schemeClr val="tx1"/>
+              </a:solidFill>
+            </a:endParaRPr>
+          </a:p>
+        </p:txBody>
+      </p:sp>
+      <p:cxnSp>
+        <p:nvCxnSpPr>
+          <p:cNvPr id="85" name="Conector curvado 84"/>
+          <p:cNvCxnSpPr>
+            <a:stCxn id="84" idx="3"/>
+            <a:endCxn id="83" idx="1"/>
+          </p:cNvCxnSpPr>
+          <p:nvPr/>
+        </p:nvCxnSpPr>
+        <p:spPr>
+          <a:xfrm>
+            <a:off x="4543633" y="4141117"/>
+            <a:ext cx="305534" cy="12700"/>
+          </a:xfrm>
+          <a:prstGeom prst="curvedConnector3">
+            <a:avLst>
+              <a:gd name="adj1" fmla="val 50000"/>
             </a:avLst>
           </a:prstGeom>
           <a:ln w="12700">
@@ -5116,6 +5965,2685 @@
     <p:extLst>
       <p:ext uri="{BB962C8B-B14F-4D97-AF65-F5344CB8AC3E}">
         <p14:creationId xmlns:p14="http://schemas.microsoft.com/office/powerpoint/2010/main" val="3310461573"/>
+      </p:ext>
+    </p:extLst>
+  </p:cSld>
+  <p:clrMapOvr>
+    <a:masterClrMapping/>
+  </p:clrMapOvr>
+</p:sld>
+</file>
+
+<file path=ppt/slides/slide2.xml><?xml version="1.0" encoding="utf-8"?>
+<p:sld xmlns:a="http://schemas.openxmlformats.org/drawingml/2006/main" xmlns:r="http://schemas.openxmlformats.org/officeDocument/2006/relationships" xmlns:p="http://schemas.openxmlformats.org/presentationml/2006/main">
+  <p:cSld>
+    <p:spTree>
+      <p:nvGrpSpPr>
+        <p:cNvPr id="1" name=""/>
+        <p:cNvGrpSpPr/>
+        <p:nvPr/>
+      </p:nvGrpSpPr>
+      <p:grpSpPr>
+        <a:xfrm>
+          <a:off x="0" y="0"/>
+          <a:ext cx="0" cy="0"/>
+          <a:chOff x="0" y="0"/>
+          <a:chExt cx="0" cy="0"/>
+        </a:xfrm>
+      </p:grpSpPr>
+      <p:sp>
+        <p:nvSpPr>
+          <p:cNvPr id="4" name="Rectángulo 3"/>
+          <p:cNvSpPr/>
+          <p:nvPr/>
+        </p:nvSpPr>
+        <p:spPr>
+          <a:xfrm>
+            <a:off x="325377" y="1429144"/>
+            <a:ext cx="1983308" cy="1257299"/>
+          </a:xfrm>
+          <a:prstGeom prst="rect">
+            <a:avLst/>
+          </a:prstGeom>
+          <a:noFill/>
+          <a:ln w="19050">
+            <a:solidFill>
+              <a:schemeClr val="tx1"/>
+            </a:solidFill>
+          </a:ln>
+        </p:spPr>
+        <p:style>
+          <a:lnRef idx="2">
+            <a:schemeClr val="accent1">
+              <a:shade val="50000"/>
+            </a:schemeClr>
+          </a:lnRef>
+          <a:fillRef idx="1">
+            <a:schemeClr val="accent1"/>
+          </a:fillRef>
+          <a:effectRef idx="0">
+            <a:schemeClr val="accent1"/>
+          </a:effectRef>
+          <a:fontRef idx="minor">
+            <a:schemeClr val="lt1"/>
+          </a:fontRef>
+        </p:style>
+        <p:txBody>
+          <a:bodyPr rtlCol="0" anchor="ctr"/>
+          <a:lstStyle/>
+          <a:p>
+            <a:pPr algn="ctr"/>
+            <a:endParaRPr lang="es-VE" dirty="0"/>
+          </a:p>
+        </p:txBody>
+      </p:sp>
+      <p:sp>
+        <p:nvSpPr>
+          <p:cNvPr id="6" name="Rectángulo 5"/>
+          <p:cNvSpPr/>
+          <p:nvPr/>
+        </p:nvSpPr>
+        <p:spPr>
+          <a:xfrm>
+            <a:off x="439702" y="2131419"/>
+            <a:ext cx="1754658" cy="407773"/>
+          </a:xfrm>
+          <a:prstGeom prst="rect">
+            <a:avLst/>
+          </a:prstGeom>
+          <a:noFill/>
+          <a:ln w="38100">
+            <a:solidFill>
+              <a:schemeClr val="tx1"/>
+            </a:solidFill>
+          </a:ln>
+        </p:spPr>
+        <p:style>
+          <a:lnRef idx="2">
+            <a:schemeClr val="accent1">
+              <a:shade val="50000"/>
+            </a:schemeClr>
+          </a:lnRef>
+          <a:fillRef idx="1">
+            <a:schemeClr val="accent1"/>
+          </a:fillRef>
+          <a:effectRef idx="0">
+            <a:schemeClr val="accent1"/>
+          </a:effectRef>
+          <a:fontRef idx="minor">
+            <a:schemeClr val="lt1"/>
+          </a:fontRef>
+        </p:style>
+        <p:txBody>
+          <a:bodyPr rtlCol="0" anchor="ctr"/>
+          <a:lstStyle/>
+          <a:p>
+            <a:pPr algn="ctr"/>
+            <a:r>
+              <a:rPr lang="es-VE" sz="1400" dirty="0" err="1">
+                <a:solidFill>
+                  <a:schemeClr val="tx1"/>
+                </a:solidFill>
+              </a:rPr>
+              <a:t>f</a:t>
+            </a:r>
+            <a:r>
+              <a:rPr lang="es-VE" sz="1400" dirty="0" err="1" smtClean="0">
+                <a:solidFill>
+                  <a:schemeClr val="tx1"/>
+                </a:solidFill>
+              </a:rPr>
+              <a:t>echa_presentacion</a:t>
+            </a:r>
+            <a:endParaRPr lang="es-VE" sz="1400" dirty="0">
+              <a:solidFill>
+                <a:schemeClr val="tx1"/>
+              </a:solidFill>
+            </a:endParaRPr>
+          </a:p>
+        </p:txBody>
+      </p:sp>
+      <p:sp>
+        <p:nvSpPr>
+          <p:cNvPr id="7" name="Rectángulo 6"/>
+          <p:cNvSpPr/>
+          <p:nvPr/>
+        </p:nvSpPr>
+        <p:spPr>
+          <a:xfrm>
+            <a:off x="567055" y="1576395"/>
+            <a:ext cx="1499952" cy="407773"/>
+          </a:xfrm>
+          <a:prstGeom prst="rect">
+            <a:avLst/>
+          </a:prstGeom>
+          <a:noFill/>
+          <a:ln w="38100">
+            <a:solidFill>
+              <a:schemeClr val="tx1"/>
+            </a:solidFill>
+          </a:ln>
+        </p:spPr>
+        <p:style>
+          <a:lnRef idx="2">
+            <a:schemeClr val="accent1">
+              <a:shade val="50000"/>
+            </a:schemeClr>
+          </a:lnRef>
+          <a:fillRef idx="1">
+            <a:schemeClr val="accent1"/>
+          </a:fillRef>
+          <a:effectRef idx="0">
+            <a:schemeClr val="accent1"/>
+          </a:effectRef>
+          <a:fontRef idx="minor">
+            <a:schemeClr val="lt1"/>
+          </a:fontRef>
+        </p:style>
+        <p:txBody>
+          <a:bodyPr rtlCol="0" anchor="ctr"/>
+          <a:lstStyle/>
+          <a:p>
+            <a:pPr algn="ctr"/>
+            <a:r>
+              <a:rPr lang="es-VE" sz="1400" dirty="0" err="1">
+                <a:solidFill>
+                  <a:schemeClr val="tx1"/>
+                </a:solidFill>
+              </a:rPr>
+              <a:t>c</a:t>
+            </a:r>
+            <a:r>
+              <a:rPr lang="es-VE" sz="1400" dirty="0" err="1" smtClean="0">
+                <a:solidFill>
+                  <a:schemeClr val="tx1"/>
+                </a:solidFill>
+              </a:rPr>
+              <a:t>odigo_cantante</a:t>
+            </a:r>
+            <a:endParaRPr lang="es-VE" sz="1400" dirty="0">
+              <a:solidFill>
+                <a:schemeClr val="tx1"/>
+              </a:solidFill>
+            </a:endParaRPr>
+          </a:p>
+        </p:txBody>
+      </p:sp>
+      <p:sp>
+        <p:nvSpPr>
+          <p:cNvPr id="17" name="Rectángulo 16"/>
+          <p:cNvSpPr/>
+          <p:nvPr/>
+        </p:nvSpPr>
+        <p:spPr>
+          <a:xfrm>
+            <a:off x="2954982" y="1073189"/>
+            <a:ext cx="1331390" cy="407773"/>
+          </a:xfrm>
+          <a:prstGeom prst="rect">
+            <a:avLst/>
+          </a:prstGeom>
+          <a:noFill/>
+          <a:ln w="38100">
+            <a:solidFill>
+              <a:schemeClr val="tx1"/>
+            </a:solidFill>
+          </a:ln>
+        </p:spPr>
+        <p:style>
+          <a:lnRef idx="2">
+            <a:schemeClr val="accent1">
+              <a:shade val="50000"/>
+            </a:schemeClr>
+          </a:lnRef>
+          <a:fillRef idx="1">
+            <a:schemeClr val="accent1"/>
+          </a:fillRef>
+          <a:effectRef idx="0">
+            <a:schemeClr val="accent1"/>
+          </a:effectRef>
+          <a:fontRef idx="minor">
+            <a:schemeClr val="lt1"/>
+          </a:fontRef>
+        </p:style>
+        <p:txBody>
+          <a:bodyPr rtlCol="0" anchor="ctr"/>
+          <a:lstStyle/>
+          <a:p>
+            <a:pPr algn="ctr"/>
+            <a:r>
+              <a:rPr lang="es-VE" sz="1400" dirty="0" err="1">
+                <a:solidFill>
+                  <a:schemeClr val="tx1"/>
+                </a:solidFill>
+              </a:rPr>
+              <a:t>a</a:t>
+            </a:r>
+            <a:r>
+              <a:rPr lang="es-VE" sz="1400" dirty="0" err="1" smtClean="0">
+                <a:solidFill>
+                  <a:schemeClr val="tx1"/>
+                </a:solidFill>
+              </a:rPr>
+              <a:t>lias_cantante</a:t>
+            </a:r>
+            <a:endParaRPr lang="es-VE" sz="1400" dirty="0">
+              <a:solidFill>
+                <a:schemeClr val="tx1"/>
+              </a:solidFill>
+            </a:endParaRPr>
+          </a:p>
+        </p:txBody>
+      </p:sp>
+      <p:sp>
+        <p:nvSpPr>
+          <p:cNvPr id="22" name="Rectángulo 21"/>
+          <p:cNvSpPr/>
+          <p:nvPr/>
+        </p:nvSpPr>
+        <p:spPr>
+          <a:xfrm>
+            <a:off x="3064315" y="1589006"/>
+            <a:ext cx="1112724" cy="407773"/>
+          </a:xfrm>
+          <a:prstGeom prst="rect">
+            <a:avLst/>
+          </a:prstGeom>
+          <a:noFill/>
+          <a:ln w="38100">
+            <a:solidFill>
+              <a:schemeClr val="tx1"/>
+            </a:solidFill>
+          </a:ln>
+        </p:spPr>
+        <p:style>
+          <a:lnRef idx="2">
+            <a:schemeClr val="accent1">
+              <a:shade val="50000"/>
+            </a:schemeClr>
+          </a:lnRef>
+          <a:fillRef idx="1">
+            <a:schemeClr val="accent1"/>
+          </a:fillRef>
+          <a:effectRef idx="0">
+            <a:schemeClr val="accent1"/>
+          </a:effectRef>
+          <a:fontRef idx="minor">
+            <a:schemeClr val="lt1"/>
+          </a:fontRef>
+        </p:style>
+        <p:txBody>
+          <a:bodyPr rtlCol="0" anchor="ctr"/>
+          <a:lstStyle/>
+          <a:p>
+            <a:pPr algn="ctr"/>
+            <a:r>
+              <a:rPr lang="es-VE" sz="1400" dirty="0" smtClean="0">
+                <a:solidFill>
+                  <a:schemeClr val="tx1"/>
+                </a:solidFill>
+              </a:rPr>
+              <a:t>nacionalidad</a:t>
+            </a:r>
+            <a:endParaRPr lang="es-VE" sz="1400" dirty="0">
+              <a:solidFill>
+                <a:schemeClr val="tx1"/>
+              </a:solidFill>
+            </a:endParaRPr>
+          </a:p>
+        </p:txBody>
+      </p:sp>
+      <p:cxnSp>
+        <p:nvCxnSpPr>
+          <p:cNvPr id="33" name="Conector curvado 32"/>
+          <p:cNvCxnSpPr>
+            <a:stCxn id="7" idx="3"/>
+            <a:endCxn id="17" idx="1"/>
+          </p:cNvCxnSpPr>
+          <p:nvPr/>
+        </p:nvCxnSpPr>
+        <p:spPr>
+          <a:xfrm flipV="1">
+            <a:off x="2067007" y="1277076"/>
+            <a:ext cx="887975" cy="503206"/>
+          </a:xfrm>
+          <a:prstGeom prst="curvedConnector3">
+            <a:avLst>
+              <a:gd name="adj1" fmla="val 50000"/>
+            </a:avLst>
+          </a:prstGeom>
+          <a:ln w="12700">
+            <a:solidFill>
+              <a:schemeClr val="tx1"/>
+            </a:solidFill>
+            <a:tailEnd type="triangle"/>
+          </a:ln>
+        </p:spPr>
+        <p:style>
+          <a:lnRef idx="1">
+            <a:schemeClr val="accent1"/>
+          </a:lnRef>
+          <a:fillRef idx="0">
+            <a:schemeClr val="accent1"/>
+          </a:fillRef>
+          <a:effectRef idx="0">
+            <a:schemeClr val="accent1"/>
+          </a:effectRef>
+          <a:fontRef idx="minor">
+            <a:schemeClr val="tx1"/>
+          </a:fontRef>
+        </p:style>
+      </p:cxnSp>
+      <p:cxnSp>
+        <p:nvCxnSpPr>
+          <p:cNvPr id="34" name="Conector curvado 33"/>
+          <p:cNvCxnSpPr>
+            <a:stCxn id="7" idx="3"/>
+            <a:endCxn id="22" idx="1"/>
+          </p:cNvCxnSpPr>
+          <p:nvPr/>
+        </p:nvCxnSpPr>
+        <p:spPr>
+          <a:xfrm>
+            <a:off x="2067007" y="1780282"/>
+            <a:ext cx="997308" cy="12611"/>
+          </a:xfrm>
+          <a:prstGeom prst="curvedConnector3">
+            <a:avLst/>
+          </a:prstGeom>
+          <a:ln w="12700">
+            <a:solidFill>
+              <a:schemeClr val="tx1"/>
+            </a:solidFill>
+            <a:tailEnd type="triangle"/>
+          </a:ln>
+        </p:spPr>
+        <p:style>
+          <a:lnRef idx="1">
+            <a:schemeClr val="accent1"/>
+          </a:lnRef>
+          <a:fillRef idx="0">
+            <a:schemeClr val="accent1"/>
+          </a:fillRef>
+          <a:effectRef idx="0">
+            <a:schemeClr val="accent1"/>
+          </a:effectRef>
+          <a:fontRef idx="minor">
+            <a:schemeClr val="tx1"/>
+          </a:fontRef>
+        </p:style>
+      </p:cxnSp>
+      <p:sp>
+        <p:nvSpPr>
+          <p:cNvPr id="37" name="Rectángulo 36"/>
+          <p:cNvSpPr/>
+          <p:nvPr/>
+        </p:nvSpPr>
+        <p:spPr>
+          <a:xfrm>
+            <a:off x="2954924" y="2300743"/>
+            <a:ext cx="1396628" cy="407773"/>
+          </a:xfrm>
+          <a:prstGeom prst="rect">
+            <a:avLst/>
+          </a:prstGeom>
+          <a:noFill/>
+          <a:ln w="38100">
+            <a:solidFill>
+              <a:schemeClr val="tx1"/>
+            </a:solidFill>
+          </a:ln>
+        </p:spPr>
+        <p:style>
+          <a:lnRef idx="2">
+            <a:schemeClr val="accent1">
+              <a:shade val="50000"/>
+            </a:schemeClr>
+          </a:lnRef>
+          <a:fillRef idx="1">
+            <a:schemeClr val="accent1"/>
+          </a:fillRef>
+          <a:effectRef idx="0">
+            <a:schemeClr val="accent1"/>
+          </a:effectRef>
+          <a:fontRef idx="minor">
+            <a:schemeClr val="lt1"/>
+          </a:fontRef>
+        </p:style>
+        <p:txBody>
+          <a:bodyPr rtlCol="0" anchor="ctr"/>
+          <a:lstStyle/>
+          <a:p>
+            <a:pPr algn="ctr"/>
+            <a:r>
+              <a:rPr lang="es-VE" sz="1400" dirty="0" err="1" smtClean="0">
+                <a:solidFill>
+                  <a:schemeClr val="tx1"/>
+                </a:solidFill>
+              </a:rPr>
+              <a:t>nombre_real</a:t>
+            </a:r>
+            <a:endParaRPr lang="es-VE" sz="1400" dirty="0">
+              <a:solidFill>
+                <a:schemeClr val="tx1"/>
+              </a:solidFill>
+            </a:endParaRPr>
+          </a:p>
+        </p:txBody>
+      </p:sp>
+      <p:sp>
+        <p:nvSpPr>
+          <p:cNvPr id="48" name="Rectángulo 47"/>
+          <p:cNvSpPr/>
+          <p:nvPr/>
+        </p:nvSpPr>
+        <p:spPr>
+          <a:xfrm>
+            <a:off x="2786420" y="965145"/>
+            <a:ext cx="1668514" cy="1124491"/>
+          </a:xfrm>
+          <a:prstGeom prst="rect">
+            <a:avLst/>
+          </a:prstGeom>
+          <a:noFill/>
+          <a:ln w="19050">
+            <a:solidFill>
+              <a:schemeClr val="tx1"/>
+            </a:solidFill>
+          </a:ln>
+        </p:spPr>
+        <p:style>
+          <a:lnRef idx="2">
+            <a:schemeClr val="accent1">
+              <a:shade val="50000"/>
+            </a:schemeClr>
+          </a:lnRef>
+          <a:fillRef idx="1">
+            <a:schemeClr val="accent1"/>
+          </a:fillRef>
+          <a:effectRef idx="0">
+            <a:schemeClr val="accent1"/>
+          </a:effectRef>
+          <a:fontRef idx="minor">
+            <a:schemeClr val="lt1"/>
+          </a:fontRef>
+        </p:style>
+        <p:txBody>
+          <a:bodyPr rtlCol="0" anchor="ctr"/>
+          <a:lstStyle/>
+          <a:p>
+            <a:pPr algn="ctr"/>
+            <a:endParaRPr lang="es-VE"/>
+          </a:p>
+        </p:txBody>
+      </p:sp>
+      <p:cxnSp>
+        <p:nvCxnSpPr>
+          <p:cNvPr id="59" name="Conector curvado 58"/>
+          <p:cNvCxnSpPr>
+            <a:stCxn id="7" idx="3"/>
+            <a:endCxn id="37" idx="1"/>
+          </p:cNvCxnSpPr>
+          <p:nvPr/>
+        </p:nvCxnSpPr>
+        <p:spPr>
+          <a:xfrm>
+            <a:off x="2067007" y="1780282"/>
+            <a:ext cx="887917" cy="724348"/>
+          </a:xfrm>
+          <a:prstGeom prst="curvedConnector3">
+            <a:avLst/>
+          </a:prstGeom>
+          <a:ln w="12700">
+            <a:solidFill>
+              <a:schemeClr val="tx1"/>
+            </a:solidFill>
+            <a:tailEnd type="triangle"/>
+          </a:ln>
+        </p:spPr>
+        <p:style>
+          <a:lnRef idx="1">
+            <a:schemeClr val="accent1"/>
+          </a:lnRef>
+          <a:fillRef idx="0">
+            <a:schemeClr val="accent1"/>
+          </a:fillRef>
+          <a:effectRef idx="0">
+            <a:schemeClr val="accent1"/>
+          </a:effectRef>
+          <a:fontRef idx="minor">
+            <a:schemeClr val="tx1"/>
+          </a:fontRef>
+        </p:style>
+      </p:cxnSp>
+      <p:cxnSp>
+        <p:nvCxnSpPr>
+          <p:cNvPr id="61" name="Conector curvado 60"/>
+          <p:cNvCxnSpPr>
+            <a:stCxn id="48" idx="3"/>
+            <a:endCxn id="37" idx="3"/>
+          </p:cNvCxnSpPr>
+          <p:nvPr/>
+        </p:nvCxnSpPr>
+        <p:spPr>
+          <a:xfrm flipH="1">
+            <a:off x="4351552" y="1527391"/>
+            <a:ext cx="103382" cy="977239"/>
+          </a:xfrm>
+          <a:prstGeom prst="curvedConnector3">
+            <a:avLst>
+              <a:gd name="adj1" fmla="val -221122"/>
+            </a:avLst>
+          </a:prstGeom>
+          <a:ln w="12700">
+            <a:solidFill>
+              <a:schemeClr val="tx1"/>
+            </a:solidFill>
+            <a:tailEnd type="triangle"/>
+          </a:ln>
+        </p:spPr>
+        <p:style>
+          <a:lnRef idx="1">
+            <a:schemeClr val="accent1"/>
+          </a:lnRef>
+          <a:fillRef idx="0">
+            <a:schemeClr val="accent1"/>
+          </a:fillRef>
+          <a:effectRef idx="0">
+            <a:schemeClr val="accent1"/>
+          </a:effectRef>
+          <a:fontRef idx="minor">
+            <a:schemeClr val="tx1"/>
+          </a:fontRef>
+        </p:style>
+      </p:cxnSp>
+      <p:sp>
+        <p:nvSpPr>
+          <p:cNvPr id="67" name="Rectángulo 66"/>
+          <p:cNvSpPr/>
+          <p:nvPr/>
+        </p:nvSpPr>
+        <p:spPr>
+          <a:xfrm>
+            <a:off x="326658" y="363521"/>
+            <a:ext cx="877330" cy="407773"/>
+          </a:xfrm>
+          <a:prstGeom prst="rect">
+            <a:avLst/>
+          </a:prstGeom>
+          <a:noFill/>
+          <a:ln w="38100">
+            <a:solidFill>
+              <a:schemeClr val="tx1"/>
+            </a:solidFill>
+          </a:ln>
+        </p:spPr>
+        <p:style>
+          <a:lnRef idx="2">
+            <a:schemeClr val="accent1">
+              <a:shade val="50000"/>
+            </a:schemeClr>
+          </a:lnRef>
+          <a:fillRef idx="1">
+            <a:schemeClr val="accent1"/>
+          </a:fillRef>
+          <a:effectRef idx="0">
+            <a:schemeClr val="accent1"/>
+          </a:effectRef>
+          <a:fontRef idx="minor">
+            <a:schemeClr val="lt1"/>
+          </a:fontRef>
+        </p:style>
+        <p:txBody>
+          <a:bodyPr rtlCol="0" anchor="ctr"/>
+          <a:lstStyle/>
+          <a:p>
+            <a:pPr algn="ctr"/>
+            <a:r>
+              <a:rPr lang="es-VE" sz="1400" dirty="0" smtClean="0">
+                <a:solidFill>
+                  <a:schemeClr val="tx1"/>
+                </a:solidFill>
+              </a:rPr>
+              <a:t>lugar</a:t>
+            </a:r>
+            <a:endParaRPr lang="es-VE" sz="1400" dirty="0">
+              <a:solidFill>
+                <a:schemeClr val="tx1"/>
+              </a:solidFill>
+            </a:endParaRPr>
+          </a:p>
+        </p:txBody>
+      </p:sp>
+      <p:cxnSp>
+        <p:nvCxnSpPr>
+          <p:cNvPr id="70" name="Conector curvado 69"/>
+          <p:cNvCxnSpPr>
+            <a:stCxn id="4" idx="0"/>
+            <a:endCxn id="67" idx="2"/>
+          </p:cNvCxnSpPr>
+          <p:nvPr/>
+        </p:nvCxnSpPr>
+        <p:spPr>
+          <a:xfrm rot="16200000" flipV="1">
+            <a:off x="712252" y="824365"/>
+            <a:ext cx="657850" cy="551708"/>
+          </a:xfrm>
+          <a:prstGeom prst="curvedConnector3">
+            <a:avLst>
+              <a:gd name="adj1" fmla="val 50000"/>
+            </a:avLst>
+          </a:prstGeom>
+          <a:ln w="12700">
+            <a:solidFill>
+              <a:schemeClr val="tx1"/>
+            </a:solidFill>
+            <a:tailEnd type="triangle"/>
+          </a:ln>
+        </p:spPr>
+        <p:style>
+          <a:lnRef idx="1">
+            <a:schemeClr val="accent1"/>
+          </a:lnRef>
+          <a:fillRef idx="0">
+            <a:schemeClr val="accent1"/>
+          </a:fillRef>
+          <a:effectRef idx="0">
+            <a:schemeClr val="accent1"/>
+          </a:effectRef>
+          <a:fontRef idx="minor">
+            <a:schemeClr val="tx1"/>
+          </a:fontRef>
+        </p:style>
+      </p:cxnSp>
+      <p:sp>
+        <p:nvSpPr>
+          <p:cNvPr id="62" name="Rectángulo 61"/>
+          <p:cNvSpPr/>
+          <p:nvPr/>
+        </p:nvSpPr>
+        <p:spPr>
+          <a:xfrm>
+            <a:off x="1458658" y="366664"/>
+            <a:ext cx="1099294" cy="407773"/>
+          </a:xfrm>
+          <a:prstGeom prst="rect">
+            <a:avLst/>
+          </a:prstGeom>
+          <a:noFill/>
+          <a:ln w="38100">
+            <a:solidFill>
+              <a:schemeClr val="tx1"/>
+            </a:solidFill>
+          </a:ln>
+        </p:spPr>
+        <p:style>
+          <a:lnRef idx="2">
+            <a:schemeClr val="accent1">
+              <a:shade val="50000"/>
+            </a:schemeClr>
+          </a:lnRef>
+          <a:fillRef idx="1">
+            <a:schemeClr val="accent1"/>
+          </a:fillRef>
+          <a:effectRef idx="0">
+            <a:schemeClr val="accent1"/>
+          </a:effectRef>
+          <a:fontRef idx="minor">
+            <a:schemeClr val="lt1"/>
+          </a:fontRef>
+        </p:style>
+        <p:txBody>
+          <a:bodyPr rtlCol="0" anchor="ctr"/>
+          <a:lstStyle/>
+          <a:p>
+            <a:pPr algn="ctr"/>
+            <a:r>
+              <a:rPr lang="es-VE" sz="1400" dirty="0" smtClean="0">
+                <a:solidFill>
+                  <a:schemeClr val="tx1"/>
+                </a:solidFill>
+              </a:rPr>
+              <a:t>repertorio</a:t>
+            </a:r>
+            <a:endParaRPr lang="es-VE" sz="1400" dirty="0">
+              <a:solidFill>
+                <a:schemeClr val="tx1"/>
+              </a:solidFill>
+            </a:endParaRPr>
+          </a:p>
+        </p:txBody>
+      </p:sp>
+      <p:cxnSp>
+        <p:nvCxnSpPr>
+          <p:cNvPr id="29" name="Conector curvado 28"/>
+          <p:cNvCxnSpPr>
+            <a:stCxn id="4" idx="0"/>
+            <a:endCxn id="62" idx="2"/>
+          </p:cNvCxnSpPr>
+          <p:nvPr/>
+        </p:nvCxnSpPr>
+        <p:spPr>
+          <a:xfrm rot="5400000" flipH="1" flipV="1">
+            <a:off x="1335315" y="756154"/>
+            <a:ext cx="654707" cy="691274"/>
+          </a:xfrm>
+          <a:prstGeom prst="curvedConnector3">
+            <a:avLst>
+              <a:gd name="adj1" fmla="val 50000"/>
+            </a:avLst>
+          </a:prstGeom>
+          <a:ln w="12700">
+            <a:solidFill>
+              <a:schemeClr val="tx1"/>
+            </a:solidFill>
+            <a:tailEnd type="triangle"/>
+          </a:ln>
+        </p:spPr>
+        <p:style>
+          <a:lnRef idx="1">
+            <a:schemeClr val="accent1"/>
+          </a:lnRef>
+          <a:fillRef idx="0">
+            <a:schemeClr val="accent1"/>
+          </a:fillRef>
+          <a:effectRef idx="0">
+            <a:schemeClr val="accent1"/>
+          </a:effectRef>
+          <a:fontRef idx="minor">
+            <a:schemeClr val="tx1"/>
+          </a:fontRef>
+        </p:style>
+      </p:cxnSp>
+      <p:cxnSp>
+        <p:nvCxnSpPr>
+          <p:cNvPr id="50" name="Conector curvado 49"/>
+          <p:cNvCxnSpPr>
+            <a:stCxn id="67" idx="0"/>
+            <a:endCxn id="62" idx="0"/>
+          </p:cNvCxnSpPr>
+          <p:nvPr/>
+        </p:nvCxnSpPr>
+        <p:spPr>
+          <a:xfrm rot="16200000" flipH="1">
+            <a:off x="1385242" y="-256399"/>
+            <a:ext cx="3143" cy="1242982"/>
+          </a:xfrm>
+          <a:prstGeom prst="curvedConnector3">
+            <a:avLst>
+              <a:gd name="adj1" fmla="val -7273306"/>
+            </a:avLst>
+          </a:prstGeom>
+          <a:ln w="12700">
+            <a:solidFill>
+              <a:schemeClr val="tx1"/>
+            </a:solidFill>
+            <a:tailEnd type="triangle"/>
+          </a:ln>
+        </p:spPr>
+        <p:style>
+          <a:lnRef idx="1">
+            <a:schemeClr val="accent1"/>
+          </a:lnRef>
+          <a:fillRef idx="0">
+            <a:schemeClr val="accent1"/>
+          </a:fillRef>
+          <a:effectRef idx="0">
+            <a:schemeClr val="accent1"/>
+          </a:effectRef>
+          <a:fontRef idx="minor">
+            <a:schemeClr val="tx1"/>
+          </a:fontRef>
+        </p:style>
+      </p:cxnSp>
+      <p:sp>
+        <p:nvSpPr>
+          <p:cNvPr id="166" name="Rectángulo 165"/>
+          <p:cNvSpPr/>
+          <p:nvPr/>
+        </p:nvSpPr>
+        <p:spPr>
+          <a:xfrm>
+            <a:off x="8007443" y="337072"/>
+            <a:ext cx="1983308" cy="1257299"/>
+          </a:xfrm>
+          <a:prstGeom prst="rect">
+            <a:avLst/>
+          </a:prstGeom>
+          <a:noFill/>
+          <a:ln w="19050">
+            <a:solidFill>
+              <a:schemeClr val="tx1"/>
+            </a:solidFill>
+          </a:ln>
+        </p:spPr>
+        <p:style>
+          <a:lnRef idx="2">
+            <a:schemeClr val="accent1">
+              <a:shade val="50000"/>
+            </a:schemeClr>
+          </a:lnRef>
+          <a:fillRef idx="1">
+            <a:schemeClr val="accent1"/>
+          </a:fillRef>
+          <a:effectRef idx="0">
+            <a:schemeClr val="accent1"/>
+          </a:effectRef>
+          <a:fontRef idx="minor">
+            <a:schemeClr val="lt1"/>
+          </a:fontRef>
+        </p:style>
+        <p:txBody>
+          <a:bodyPr rtlCol="0" anchor="ctr"/>
+          <a:lstStyle/>
+          <a:p>
+            <a:pPr algn="ctr"/>
+            <a:endParaRPr lang="es-VE" dirty="0"/>
+          </a:p>
+        </p:txBody>
+      </p:sp>
+      <p:sp>
+        <p:nvSpPr>
+          <p:cNvPr id="167" name="Rectángulo 166"/>
+          <p:cNvSpPr/>
+          <p:nvPr/>
+        </p:nvSpPr>
+        <p:spPr>
+          <a:xfrm>
+            <a:off x="8121768" y="1039347"/>
+            <a:ext cx="1754658" cy="407773"/>
+          </a:xfrm>
+          <a:prstGeom prst="rect">
+            <a:avLst/>
+          </a:prstGeom>
+          <a:noFill/>
+          <a:ln w="38100">
+            <a:solidFill>
+              <a:schemeClr val="tx1"/>
+            </a:solidFill>
+          </a:ln>
+        </p:spPr>
+        <p:style>
+          <a:lnRef idx="2">
+            <a:schemeClr val="accent1">
+              <a:shade val="50000"/>
+            </a:schemeClr>
+          </a:lnRef>
+          <a:fillRef idx="1">
+            <a:schemeClr val="accent1"/>
+          </a:fillRef>
+          <a:effectRef idx="0">
+            <a:schemeClr val="accent1"/>
+          </a:effectRef>
+          <a:fontRef idx="minor">
+            <a:schemeClr val="lt1"/>
+          </a:fontRef>
+        </p:style>
+        <p:txBody>
+          <a:bodyPr rtlCol="0" anchor="ctr"/>
+          <a:lstStyle/>
+          <a:p>
+            <a:pPr algn="ctr"/>
+            <a:r>
+              <a:rPr lang="es-VE" sz="1400" dirty="0" err="1">
+                <a:solidFill>
+                  <a:schemeClr val="tx1"/>
+                </a:solidFill>
+              </a:rPr>
+              <a:t>f</a:t>
+            </a:r>
+            <a:r>
+              <a:rPr lang="es-VE" sz="1400" dirty="0" err="1" smtClean="0">
+                <a:solidFill>
+                  <a:schemeClr val="tx1"/>
+                </a:solidFill>
+              </a:rPr>
+              <a:t>echa_presentacion</a:t>
+            </a:r>
+            <a:endParaRPr lang="es-VE" sz="1400" dirty="0">
+              <a:solidFill>
+                <a:schemeClr val="tx1"/>
+              </a:solidFill>
+            </a:endParaRPr>
+          </a:p>
+        </p:txBody>
+      </p:sp>
+      <p:sp>
+        <p:nvSpPr>
+          <p:cNvPr id="168" name="Rectángulo 167"/>
+          <p:cNvSpPr/>
+          <p:nvPr/>
+        </p:nvSpPr>
+        <p:spPr>
+          <a:xfrm>
+            <a:off x="8249121" y="484323"/>
+            <a:ext cx="1499952" cy="407773"/>
+          </a:xfrm>
+          <a:prstGeom prst="rect">
+            <a:avLst/>
+          </a:prstGeom>
+          <a:noFill/>
+          <a:ln w="38100">
+            <a:solidFill>
+              <a:schemeClr val="tx1"/>
+            </a:solidFill>
+          </a:ln>
+        </p:spPr>
+        <p:style>
+          <a:lnRef idx="2">
+            <a:schemeClr val="accent1">
+              <a:shade val="50000"/>
+            </a:schemeClr>
+          </a:lnRef>
+          <a:fillRef idx="1">
+            <a:schemeClr val="accent1"/>
+          </a:fillRef>
+          <a:effectRef idx="0">
+            <a:schemeClr val="accent1"/>
+          </a:effectRef>
+          <a:fontRef idx="minor">
+            <a:schemeClr val="lt1"/>
+          </a:fontRef>
+        </p:style>
+        <p:txBody>
+          <a:bodyPr rtlCol="0" anchor="ctr"/>
+          <a:lstStyle/>
+          <a:p>
+            <a:pPr algn="ctr"/>
+            <a:r>
+              <a:rPr lang="es-VE" sz="1400" dirty="0" err="1">
+                <a:solidFill>
+                  <a:schemeClr val="tx1"/>
+                </a:solidFill>
+              </a:rPr>
+              <a:t>c</a:t>
+            </a:r>
+            <a:r>
+              <a:rPr lang="es-VE" sz="1400" dirty="0" err="1" smtClean="0">
+                <a:solidFill>
+                  <a:schemeClr val="tx1"/>
+                </a:solidFill>
+              </a:rPr>
+              <a:t>odigo_cantante</a:t>
+            </a:r>
+            <a:endParaRPr lang="es-VE" sz="1400" dirty="0">
+              <a:solidFill>
+                <a:schemeClr val="tx1"/>
+              </a:solidFill>
+            </a:endParaRPr>
+          </a:p>
+        </p:txBody>
+      </p:sp>
+      <p:sp>
+        <p:nvSpPr>
+          <p:cNvPr id="177" name="Rectángulo 176"/>
+          <p:cNvSpPr/>
+          <p:nvPr/>
+        </p:nvSpPr>
+        <p:spPr>
+          <a:xfrm>
+            <a:off x="10680785" y="312279"/>
+            <a:ext cx="877330" cy="407773"/>
+          </a:xfrm>
+          <a:prstGeom prst="rect">
+            <a:avLst/>
+          </a:prstGeom>
+          <a:noFill/>
+          <a:ln w="38100">
+            <a:solidFill>
+              <a:schemeClr val="tx1"/>
+            </a:solidFill>
+          </a:ln>
+        </p:spPr>
+        <p:style>
+          <a:lnRef idx="2">
+            <a:schemeClr val="accent1">
+              <a:shade val="50000"/>
+            </a:schemeClr>
+          </a:lnRef>
+          <a:fillRef idx="1">
+            <a:schemeClr val="accent1"/>
+          </a:fillRef>
+          <a:effectRef idx="0">
+            <a:schemeClr val="accent1"/>
+          </a:effectRef>
+          <a:fontRef idx="minor">
+            <a:schemeClr val="lt1"/>
+          </a:fontRef>
+        </p:style>
+        <p:txBody>
+          <a:bodyPr rtlCol="0" anchor="ctr"/>
+          <a:lstStyle/>
+          <a:p>
+            <a:pPr algn="ctr"/>
+            <a:r>
+              <a:rPr lang="es-VE" sz="1400" dirty="0" smtClean="0">
+                <a:solidFill>
+                  <a:schemeClr val="tx1"/>
+                </a:solidFill>
+              </a:rPr>
+              <a:t>lugar</a:t>
+            </a:r>
+            <a:endParaRPr lang="es-VE" sz="1400" dirty="0">
+              <a:solidFill>
+                <a:schemeClr val="tx1"/>
+              </a:solidFill>
+            </a:endParaRPr>
+          </a:p>
+        </p:txBody>
+      </p:sp>
+      <p:cxnSp>
+        <p:nvCxnSpPr>
+          <p:cNvPr id="178" name="Conector curvado 177"/>
+          <p:cNvCxnSpPr>
+            <a:stCxn id="166" idx="3"/>
+            <a:endCxn id="177" idx="1"/>
+          </p:cNvCxnSpPr>
+          <p:nvPr/>
+        </p:nvCxnSpPr>
+        <p:spPr>
+          <a:xfrm flipV="1">
+            <a:off x="9990751" y="516166"/>
+            <a:ext cx="690034" cy="449556"/>
+          </a:xfrm>
+          <a:prstGeom prst="curvedConnector3">
+            <a:avLst>
+              <a:gd name="adj1" fmla="val 50000"/>
+            </a:avLst>
+          </a:prstGeom>
+          <a:ln w="12700">
+            <a:solidFill>
+              <a:schemeClr val="tx1"/>
+            </a:solidFill>
+            <a:tailEnd type="triangle"/>
+          </a:ln>
+        </p:spPr>
+        <p:style>
+          <a:lnRef idx="1">
+            <a:schemeClr val="accent1"/>
+          </a:lnRef>
+          <a:fillRef idx="0">
+            <a:schemeClr val="accent1"/>
+          </a:fillRef>
+          <a:effectRef idx="0">
+            <a:schemeClr val="accent1"/>
+          </a:effectRef>
+          <a:fontRef idx="minor">
+            <a:schemeClr val="tx1"/>
+          </a:fontRef>
+        </p:style>
+      </p:cxnSp>
+      <p:sp>
+        <p:nvSpPr>
+          <p:cNvPr id="179" name="Rectángulo 178"/>
+          <p:cNvSpPr/>
+          <p:nvPr/>
+        </p:nvSpPr>
+        <p:spPr>
+          <a:xfrm>
+            <a:off x="10608406" y="1073189"/>
+            <a:ext cx="1099294" cy="407773"/>
+          </a:xfrm>
+          <a:prstGeom prst="rect">
+            <a:avLst/>
+          </a:prstGeom>
+          <a:noFill/>
+          <a:ln w="38100">
+            <a:solidFill>
+              <a:schemeClr val="tx1"/>
+            </a:solidFill>
+          </a:ln>
+        </p:spPr>
+        <p:style>
+          <a:lnRef idx="2">
+            <a:schemeClr val="accent1">
+              <a:shade val="50000"/>
+            </a:schemeClr>
+          </a:lnRef>
+          <a:fillRef idx="1">
+            <a:schemeClr val="accent1"/>
+          </a:fillRef>
+          <a:effectRef idx="0">
+            <a:schemeClr val="accent1"/>
+          </a:effectRef>
+          <a:fontRef idx="minor">
+            <a:schemeClr val="lt1"/>
+          </a:fontRef>
+        </p:style>
+        <p:txBody>
+          <a:bodyPr rtlCol="0" anchor="ctr"/>
+          <a:lstStyle/>
+          <a:p>
+            <a:pPr algn="ctr"/>
+            <a:r>
+              <a:rPr lang="es-VE" sz="1400" dirty="0" smtClean="0">
+                <a:solidFill>
+                  <a:schemeClr val="tx1"/>
+                </a:solidFill>
+              </a:rPr>
+              <a:t>repertorio</a:t>
+            </a:r>
+            <a:endParaRPr lang="es-VE" sz="1400" dirty="0">
+              <a:solidFill>
+                <a:schemeClr val="tx1"/>
+              </a:solidFill>
+            </a:endParaRPr>
+          </a:p>
+        </p:txBody>
+      </p:sp>
+      <p:cxnSp>
+        <p:nvCxnSpPr>
+          <p:cNvPr id="180" name="Conector curvado 179"/>
+          <p:cNvCxnSpPr>
+            <a:stCxn id="166" idx="3"/>
+            <a:endCxn id="179" idx="1"/>
+          </p:cNvCxnSpPr>
+          <p:nvPr/>
+        </p:nvCxnSpPr>
+        <p:spPr>
+          <a:xfrm>
+            <a:off x="9990751" y="965722"/>
+            <a:ext cx="617655" cy="311354"/>
+          </a:xfrm>
+          <a:prstGeom prst="curvedConnector3">
+            <a:avLst>
+              <a:gd name="adj1" fmla="val 50000"/>
+            </a:avLst>
+          </a:prstGeom>
+          <a:ln w="12700">
+            <a:solidFill>
+              <a:schemeClr val="tx1"/>
+            </a:solidFill>
+            <a:tailEnd type="triangle"/>
+          </a:ln>
+        </p:spPr>
+        <p:style>
+          <a:lnRef idx="1">
+            <a:schemeClr val="accent1"/>
+          </a:lnRef>
+          <a:fillRef idx="0">
+            <a:schemeClr val="accent1"/>
+          </a:fillRef>
+          <a:effectRef idx="0">
+            <a:schemeClr val="accent1"/>
+          </a:effectRef>
+          <a:fontRef idx="minor">
+            <a:schemeClr val="tx1"/>
+          </a:fontRef>
+        </p:style>
+      </p:cxnSp>
+      <p:cxnSp>
+        <p:nvCxnSpPr>
+          <p:cNvPr id="181" name="Conector curvado 180"/>
+          <p:cNvCxnSpPr>
+            <a:stCxn id="177" idx="3"/>
+            <a:endCxn id="179" idx="3"/>
+          </p:cNvCxnSpPr>
+          <p:nvPr/>
+        </p:nvCxnSpPr>
+        <p:spPr>
+          <a:xfrm>
+            <a:off x="11558115" y="516166"/>
+            <a:ext cx="149585" cy="760910"/>
+          </a:xfrm>
+          <a:prstGeom prst="curvedConnector3">
+            <a:avLst>
+              <a:gd name="adj1" fmla="val 252823"/>
+            </a:avLst>
+          </a:prstGeom>
+          <a:ln w="12700">
+            <a:solidFill>
+              <a:schemeClr val="tx1"/>
+            </a:solidFill>
+            <a:tailEnd type="triangle"/>
+          </a:ln>
+        </p:spPr>
+        <p:style>
+          <a:lnRef idx="1">
+            <a:schemeClr val="accent1"/>
+          </a:lnRef>
+          <a:fillRef idx="0">
+            <a:schemeClr val="accent1"/>
+          </a:fillRef>
+          <a:effectRef idx="0">
+            <a:schemeClr val="accent1"/>
+          </a:effectRef>
+          <a:fontRef idx="minor">
+            <a:schemeClr val="tx1"/>
+          </a:fontRef>
+        </p:style>
+      </p:cxnSp>
+      <p:sp>
+        <p:nvSpPr>
+          <p:cNvPr id="184" name="Rectángulo 183"/>
+          <p:cNvSpPr/>
+          <p:nvPr/>
+        </p:nvSpPr>
+        <p:spPr>
+          <a:xfrm>
+            <a:off x="8049723" y="2775112"/>
+            <a:ext cx="1499952" cy="407773"/>
+          </a:xfrm>
+          <a:prstGeom prst="rect">
+            <a:avLst/>
+          </a:prstGeom>
+          <a:noFill/>
+          <a:ln w="38100">
+            <a:solidFill>
+              <a:schemeClr val="tx1"/>
+            </a:solidFill>
+          </a:ln>
+        </p:spPr>
+        <p:style>
+          <a:lnRef idx="2">
+            <a:schemeClr val="accent1">
+              <a:shade val="50000"/>
+            </a:schemeClr>
+          </a:lnRef>
+          <a:fillRef idx="1">
+            <a:schemeClr val="accent1"/>
+          </a:fillRef>
+          <a:effectRef idx="0">
+            <a:schemeClr val="accent1"/>
+          </a:effectRef>
+          <a:fontRef idx="minor">
+            <a:schemeClr val="lt1"/>
+          </a:fontRef>
+        </p:style>
+        <p:txBody>
+          <a:bodyPr rtlCol="0" anchor="ctr"/>
+          <a:lstStyle/>
+          <a:p>
+            <a:pPr algn="ctr"/>
+            <a:r>
+              <a:rPr lang="es-VE" sz="1400" dirty="0" err="1">
+                <a:solidFill>
+                  <a:schemeClr val="tx1"/>
+                </a:solidFill>
+              </a:rPr>
+              <a:t>c</a:t>
+            </a:r>
+            <a:r>
+              <a:rPr lang="es-VE" sz="1400" dirty="0" err="1" smtClean="0">
+                <a:solidFill>
+                  <a:schemeClr val="tx1"/>
+                </a:solidFill>
+              </a:rPr>
+              <a:t>odigo_cantante</a:t>
+            </a:r>
+            <a:endParaRPr lang="es-VE" sz="1400" dirty="0">
+              <a:solidFill>
+                <a:schemeClr val="tx1"/>
+              </a:solidFill>
+            </a:endParaRPr>
+          </a:p>
+        </p:txBody>
+      </p:sp>
+      <p:sp>
+        <p:nvSpPr>
+          <p:cNvPr id="185" name="Rectángulo 184"/>
+          <p:cNvSpPr/>
+          <p:nvPr/>
+        </p:nvSpPr>
+        <p:spPr>
+          <a:xfrm>
+            <a:off x="10311130" y="2197680"/>
+            <a:ext cx="1331390" cy="407773"/>
+          </a:xfrm>
+          <a:prstGeom prst="rect">
+            <a:avLst/>
+          </a:prstGeom>
+          <a:noFill/>
+          <a:ln w="38100">
+            <a:solidFill>
+              <a:schemeClr val="tx1"/>
+            </a:solidFill>
+          </a:ln>
+        </p:spPr>
+        <p:style>
+          <a:lnRef idx="2">
+            <a:schemeClr val="accent1">
+              <a:shade val="50000"/>
+            </a:schemeClr>
+          </a:lnRef>
+          <a:fillRef idx="1">
+            <a:schemeClr val="accent1"/>
+          </a:fillRef>
+          <a:effectRef idx="0">
+            <a:schemeClr val="accent1"/>
+          </a:effectRef>
+          <a:fontRef idx="minor">
+            <a:schemeClr val="lt1"/>
+          </a:fontRef>
+        </p:style>
+        <p:txBody>
+          <a:bodyPr rtlCol="0" anchor="ctr"/>
+          <a:lstStyle/>
+          <a:p>
+            <a:pPr algn="ctr"/>
+            <a:r>
+              <a:rPr lang="es-VE" sz="1400" dirty="0" err="1">
+                <a:solidFill>
+                  <a:schemeClr val="tx1"/>
+                </a:solidFill>
+              </a:rPr>
+              <a:t>a</a:t>
+            </a:r>
+            <a:r>
+              <a:rPr lang="es-VE" sz="1400" dirty="0" err="1" smtClean="0">
+                <a:solidFill>
+                  <a:schemeClr val="tx1"/>
+                </a:solidFill>
+              </a:rPr>
+              <a:t>lias_cantante</a:t>
+            </a:r>
+            <a:endParaRPr lang="es-VE" sz="1400" dirty="0">
+              <a:solidFill>
+                <a:schemeClr val="tx1"/>
+              </a:solidFill>
+            </a:endParaRPr>
+          </a:p>
+        </p:txBody>
+      </p:sp>
+      <p:sp>
+        <p:nvSpPr>
+          <p:cNvPr id="186" name="Rectángulo 185"/>
+          <p:cNvSpPr/>
+          <p:nvPr/>
+        </p:nvSpPr>
+        <p:spPr>
+          <a:xfrm>
+            <a:off x="10420463" y="2713497"/>
+            <a:ext cx="1112724" cy="407773"/>
+          </a:xfrm>
+          <a:prstGeom prst="rect">
+            <a:avLst/>
+          </a:prstGeom>
+          <a:noFill/>
+          <a:ln w="38100">
+            <a:solidFill>
+              <a:schemeClr val="tx1"/>
+            </a:solidFill>
+          </a:ln>
+        </p:spPr>
+        <p:style>
+          <a:lnRef idx="2">
+            <a:schemeClr val="accent1">
+              <a:shade val="50000"/>
+            </a:schemeClr>
+          </a:lnRef>
+          <a:fillRef idx="1">
+            <a:schemeClr val="accent1"/>
+          </a:fillRef>
+          <a:effectRef idx="0">
+            <a:schemeClr val="accent1"/>
+          </a:effectRef>
+          <a:fontRef idx="minor">
+            <a:schemeClr val="lt1"/>
+          </a:fontRef>
+        </p:style>
+        <p:txBody>
+          <a:bodyPr rtlCol="0" anchor="ctr"/>
+          <a:lstStyle/>
+          <a:p>
+            <a:pPr algn="ctr"/>
+            <a:r>
+              <a:rPr lang="es-VE" sz="1400" dirty="0" smtClean="0">
+                <a:solidFill>
+                  <a:schemeClr val="tx1"/>
+                </a:solidFill>
+              </a:rPr>
+              <a:t>nacionalidad</a:t>
+            </a:r>
+            <a:endParaRPr lang="es-VE" sz="1400" dirty="0">
+              <a:solidFill>
+                <a:schemeClr val="tx1"/>
+              </a:solidFill>
+            </a:endParaRPr>
+          </a:p>
+        </p:txBody>
+      </p:sp>
+      <p:cxnSp>
+        <p:nvCxnSpPr>
+          <p:cNvPr id="187" name="Conector curvado 186"/>
+          <p:cNvCxnSpPr>
+            <a:stCxn id="184" idx="3"/>
+            <a:endCxn id="185" idx="1"/>
+          </p:cNvCxnSpPr>
+          <p:nvPr/>
+        </p:nvCxnSpPr>
+        <p:spPr>
+          <a:xfrm flipV="1">
+            <a:off x="9549675" y="2401567"/>
+            <a:ext cx="761455" cy="577432"/>
+          </a:xfrm>
+          <a:prstGeom prst="curvedConnector3">
+            <a:avLst>
+              <a:gd name="adj1" fmla="val 50000"/>
+            </a:avLst>
+          </a:prstGeom>
+          <a:ln w="12700">
+            <a:solidFill>
+              <a:schemeClr val="tx1"/>
+            </a:solidFill>
+            <a:tailEnd type="triangle"/>
+          </a:ln>
+        </p:spPr>
+        <p:style>
+          <a:lnRef idx="1">
+            <a:schemeClr val="accent1"/>
+          </a:lnRef>
+          <a:fillRef idx="0">
+            <a:schemeClr val="accent1"/>
+          </a:fillRef>
+          <a:effectRef idx="0">
+            <a:schemeClr val="accent1"/>
+          </a:effectRef>
+          <a:fontRef idx="minor">
+            <a:schemeClr val="tx1"/>
+          </a:fontRef>
+        </p:style>
+      </p:cxnSp>
+      <p:cxnSp>
+        <p:nvCxnSpPr>
+          <p:cNvPr id="188" name="Conector curvado 187"/>
+          <p:cNvCxnSpPr>
+            <a:stCxn id="184" idx="3"/>
+            <a:endCxn id="186" idx="1"/>
+          </p:cNvCxnSpPr>
+          <p:nvPr/>
+        </p:nvCxnSpPr>
+        <p:spPr>
+          <a:xfrm flipV="1">
+            <a:off x="9549675" y="2917384"/>
+            <a:ext cx="870788" cy="61615"/>
+          </a:xfrm>
+          <a:prstGeom prst="curvedConnector3">
+            <a:avLst/>
+          </a:prstGeom>
+          <a:ln w="12700">
+            <a:solidFill>
+              <a:schemeClr val="tx1"/>
+            </a:solidFill>
+            <a:tailEnd type="triangle"/>
+          </a:ln>
+        </p:spPr>
+        <p:style>
+          <a:lnRef idx="1">
+            <a:schemeClr val="accent1"/>
+          </a:lnRef>
+          <a:fillRef idx="0">
+            <a:schemeClr val="accent1"/>
+          </a:fillRef>
+          <a:effectRef idx="0">
+            <a:schemeClr val="accent1"/>
+          </a:effectRef>
+          <a:fontRef idx="minor">
+            <a:schemeClr val="tx1"/>
+          </a:fontRef>
+        </p:style>
+      </p:cxnSp>
+      <p:sp>
+        <p:nvSpPr>
+          <p:cNvPr id="189" name="Rectángulo 188"/>
+          <p:cNvSpPr/>
+          <p:nvPr/>
+        </p:nvSpPr>
+        <p:spPr>
+          <a:xfrm>
+            <a:off x="10311072" y="3425234"/>
+            <a:ext cx="1396628" cy="407773"/>
+          </a:xfrm>
+          <a:prstGeom prst="rect">
+            <a:avLst/>
+          </a:prstGeom>
+          <a:noFill/>
+          <a:ln w="38100">
+            <a:solidFill>
+              <a:schemeClr val="tx1"/>
+            </a:solidFill>
+          </a:ln>
+        </p:spPr>
+        <p:style>
+          <a:lnRef idx="2">
+            <a:schemeClr val="accent1">
+              <a:shade val="50000"/>
+            </a:schemeClr>
+          </a:lnRef>
+          <a:fillRef idx="1">
+            <a:schemeClr val="accent1"/>
+          </a:fillRef>
+          <a:effectRef idx="0">
+            <a:schemeClr val="accent1"/>
+          </a:effectRef>
+          <a:fontRef idx="minor">
+            <a:schemeClr val="lt1"/>
+          </a:fontRef>
+        </p:style>
+        <p:txBody>
+          <a:bodyPr rtlCol="0" anchor="ctr"/>
+          <a:lstStyle/>
+          <a:p>
+            <a:pPr algn="ctr"/>
+            <a:r>
+              <a:rPr lang="es-VE" sz="1400" dirty="0" err="1" smtClean="0">
+                <a:solidFill>
+                  <a:schemeClr val="tx1"/>
+                </a:solidFill>
+              </a:rPr>
+              <a:t>nombre_real</a:t>
+            </a:r>
+            <a:endParaRPr lang="es-VE" sz="1400" dirty="0">
+              <a:solidFill>
+                <a:schemeClr val="tx1"/>
+              </a:solidFill>
+            </a:endParaRPr>
+          </a:p>
+        </p:txBody>
+      </p:sp>
+      <p:sp>
+        <p:nvSpPr>
+          <p:cNvPr id="190" name="Rectángulo 189"/>
+          <p:cNvSpPr/>
+          <p:nvPr/>
+        </p:nvSpPr>
+        <p:spPr>
+          <a:xfrm>
+            <a:off x="10142568" y="2089636"/>
+            <a:ext cx="1668514" cy="1124491"/>
+          </a:xfrm>
+          <a:prstGeom prst="rect">
+            <a:avLst/>
+          </a:prstGeom>
+          <a:noFill/>
+          <a:ln w="19050">
+            <a:solidFill>
+              <a:schemeClr val="tx1"/>
+            </a:solidFill>
+          </a:ln>
+        </p:spPr>
+        <p:style>
+          <a:lnRef idx="2">
+            <a:schemeClr val="accent1">
+              <a:shade val="50000"/>
+            </a:schemeClr>
+          </a:lnRef>
+          <a:fillRef idx="1">
+            <a:schemeClr val="accent1"/>
+          </a:fillRef>
+          <a:effectRef idx="0">
+            <a:schemeClr val="accent1"/>
+          </a:effectRef>
+          <a:fontRef idx="minor">
+            <a:schemeClr val="lt1"/>
+          </a:fontRef>
+        </p:style>
+        <p:txBody>
+          <a:bodyPr rtlCol="0" anchor="ctr"/>
+          <a:lstStyle/>
+          <a:p>
+            <a:pPr algn="ctr"/>
+            <a:endParaRPr lang="es-VE"/>
+          </a:p>
+        </p:txBody>
+      </p:sp>
+      <p:cxnSp>
+        <p:nvCxnSpPr>
+          <p:cNvPr id="191" name="Conector curvado 190"/>
+          <p:cNvCxnSpPr>
+            <a:stCxn id="184" idx="3"/>
+            <a:endCxn id="189" idx="1"/>
+          </p:cNvCxnSpPr>
+          <p:nvPr/>
+        </p:nvCxnSpPr>
+        <p:spPr>
+          <a:xfrm>
+            <a:off x="9549675" y="2978999"/>
+            <a:ext cx="761397" cy="650122"/>
+          </a:xfrm>
+          <a:prstGeom prst="curvedConnector3">
+            <a:avLst/>
+          </a:prstGeom>
+          <a:ln w="12700">
+            <a:solidFill>
+              <a:schemeClr val="tx1"/>
+            </a:solidFill>
+            <a:tailEnd type="triangle"/>
+          </a:ln>
+        </p:spPr>
+        <p:style>
+          <a:lnRef idx="1">
+            <a:schemeClr val="accent1"/>
+          </a:lnRef>
+          <a:fillRef idx="0">
+            <a:schemeClr val="accent1"/>
+          </a:fillRef>
+          <a:effectRef idx="0">
+            <a:schemeClr val="accent1"/>
+          </a:effectRef>
+          <a:fontRef idx="minor">
+            <a:schemeClr val="tx1"/>
+          </a:fontRef>
+        </p:style>
+      </p:cxnSp>
+      <p:cxnSp>
+        <p:nvCxnSpPr>
+          <p:cNvPr id="192" name="Conector curvado 191"/>
+          <p:cNvCxnSpPr>
+            <a:stCxn id="190" idx="3"/>
+            <a:endCxn id="189" idx="3"/>
+          </p:cNvCxnSpPr>
+          <p:nvPr/>
+        </p:nvCxnSpPr>
+        <p:spPr>
+          <a:xfrm flipH="1">
+            <a:off x="11707700" y="2651882"/>
+            <a:ext cx="103382" cy="977239"/>
+          </a:xfrm>
+          <a:prstGeom prst="curvedConnector3">
+            <a:avLst>
+              <a:gd name="adj1" fmla="val -221122"/>
+            </a:avLst>
+          </a:prstGeom>
+          <a:ln w="12700">
+            <a:solidFill>
+              <a:schemeClr val="tx1"/>
+            </a:solidFill>
+            <a:tailEnd type="triangle"/>
+          </a:ln>
+        </p:spPr>
+        <p:style>
+          <a:lnRef idx="1">
+            <a:schemeClr val="accent1"/>
+          </a:lnRef>
+          <a:fillRef idx="0">
+            <a:schemeClr val="accent1"/>
+          </a:fillRef>
+          <a:effectRef idx="0">
+            <a:schemeClr val="accent1"/>
+          </a:effectRef>
+          <a:fontRef idx="minor">
+            <a:schemeClr val="tx1"/>
+          </a:fontRef>
+        </p:style>
+      </p:cxnSp>
+      <p:sp>
+        <p:nvSpPr>
+          <p:cNvPr id="220" name="Rectángulo 219"/>
+          <p:cNvSpPr/>
+          <p:nvPr/>
+        </p:nvSpPr>
+        <p:spPr>
+          <a:xfrm>
+            <a:off x="3653211" y="3567585"/>
+            <a:ext cx="1499952" cy="407773"/>
+          </a:xfrm>
+          <a:prstGeom prst="rect">
+            <a:avLst/>
+          </a:prstGeom>
+          <a:noFill/>
+          <a:ln w="38100">
+            <a:solidFill>
+              <a:schemeClr val="tx1"/>
+            </a:solidFill>
+          </a:ln>
+        </p:spPr>
+        <p:style>
+          <a:lnRef idx="2">
+            <a:schemeClr val="accent1">
+              <a:shade val="50000"/>
+            </a:schemeClr>
+          </a:lnRef>
+          <a:fillRef idx="1">
+            <a:schemeClr val="accent1"/>
+          </a:fillRef>
+          <a:effectRef idx="0">
+            <a:schemeClr val="accent1"/>
+          </a:effectRef>
+          <a:fontRef idx="minor">
+            <a:schemeClr val="lt1"/>
+          </a:fontRef>
+        </p:style>
+        <p:txBody>
+          <a:bodyPr rtlCol="0" anchor="ctr"/>
+          <a:lstStyle/>
+          <a:p>
+            <a:pPr algn="ctr"/>
+            <a:r>
+              <a:rPr lang="es-VE" sz="1400" dirty="0" err="1">
+                <a:solidFill>
+                  <a:schemeClr val="tx1"/>
+                </a:solidFill>
+              </a:rPr>
+              <a:t>c</a:t>
+            </a:r>
+            <a:r>
+              <a:rPr lang="es-VE" sz="1400" dirty="0" err="1" smtClean="0">
+                <a:solidFill>
+                  <a:schemeClr val="tx1"/>
+                </a:solidFill>
+              </a:rPr>
+              <a:t>odigo_cantante</a:t>
+            </a:r>
+            <a:endParaRPr lang="es-VE" sz="1400" dirty="0">
+              <a:solidFill>
+                <a:schemeClr val="tx1"/>
+              </a:solidFill>
+            </a:endParaRPr>
+          </a:p>
+        </p:txBody>
+      </p:sp>
+      <p:sp>
+        <p:nvSpPr>
+          <p:cNvPr id="221" name="Rectángulo 220"/>
+          <p:cNvSpPr/>
+          <p:nvPr/>
+        </p:nvSpPr>
+        <p:spPr>
+          <a:xfrm>
+            <a:off x="5752813" y="3317190"/>
+            <a:ext cx="1331390" cy="407773"/>
+          </a:xfrm>
+          <a:prstGeom prst="rect">
+            <a:avLst/>
+          </a:prstGeom>
+          <a:noFill/>
+          <a:ln w="38100">
+            <a:solidFill>
+              <a:schemeClr val="tx1"/>
+            </a:solidFill>
+          </a:ln>
+        </p:spPr>
+        <p:style>
+          <a:lnRef idx="2">
+            <a:schemeClr val="accent1">
+              <a:shade val="50000"/>
+            </a:schemeClr>
+          </a:lnRef>
+          <a:fillRef idx="1">
+            <a:schemeClr val="accent1"/>
+          </a:fillRef>
+          <a:effectRef idx="0">
+            <a:schemeClr val="accent1"/>
+          </a:effectRef>
+          <a:fontRef idx="minor">
+            <a:schemeClr val="lt1"/>
+          </a:fontRef>
+        </p:style>
+        <p:txBody>
+          <a:bodyPr rtlCol="0" anchor="ctr"/>
+          <a:lstStyle/>
+          <a:p>
+            <a:pPr algn="ctr"/>
+            <a:r>
+              <a:rPr lang="es-VE" sz="1400" dirty="0" err="1">
+                <a:solidFill>
+                  <a:schemeClr val="tx1"/>
+                </a:solidFill>
+              </a:rPr>
+              <a:t>a</a:t>
+            </a:r>
+            <a:r>
+              <a:rPr lang="es-VE" sz="1400" dirty="0" err="1" smtClean="0">
+                <a:solidFill>
+                  <a:schemeClr val="tx1"/>
+                </a:solidFill>
+              </a:rPr>
+              <a:t>lias_cantante</a:t>
+            </a:r>
+            <a:endParaRPr lang="es-VE" sz="1400" dirty="0">
+              <a:solidFill>
+                <a:schemeClr val="tx1"/>
+              </a:solidFill>
+            </a:endParaRPr>
+          </a:p>
+        </p:txBody>
+      </p:sp>
+      <p:sp>
+        <p:nvSpPr>
+          <p:cNvPr id="222" name="Rectángulo 221"/>
+          <p:cNvSpPr/>
+          <p:nvPr/>
+        </p:nvSpPr>
+        <p:spPr>
+          <a:xfrm>
+            <a:off x="5862146" y="3833007"/>
+            <a:ext cx="1112724" cy="407773"/>
+          </a:xfrm>
+          <a:prstGeom prst="rect">
+            <a:avLst/>
+          </a:prstGeom>
+          <a:noFill/>
+          <a:ln w="38100">
+            <a:solidFill>
+              <a:schemeClr val="tx1"/>
+            </a:solidFill>
+          </a:ln>
+        </p:spPr>
+        <p:style>
+          <a:lnRef idx="2">
+            <a:schemeClr val="accent1">
+              <a:shade val="50000"/>
+            </a:schemeClr>
+          </a:lnRef>
+          <a:fillRef idx="1">
+            <a:schemeClr val="accent1"/>
+          </a:fillRef>
+          <a:effectRef idx="0">
+            <a:schemeClr val="accent1"/>
+          </a:effectRef>
+          <a:fontRef idx="minor">
+            <a:schemeClr val="lt1"/>
+          </a:fontRef>
+        </p:style>
+        <p:txBody>
+          <a:bodyPr rtlCol="0" anchor="ctr"/>
+          <a:lstStyle/>
+          <a:p>
+            <a:pPr algn="ctr"/>
+            <a:r>
+              <a:rPr lang="es-VE" sz="1400" dirty="0" smtClean="0">
+                <a:solidFill>
+                  <a:schemeClr val="tx1"/>
+                </a:solidFill>
+              </a:rPr>
+              <a:t>nacionalidad</a:t>
+            </a:r>
+            <a:endParaRPr lang="es-VE" sz="1400" dirty="0">
+              <a:solidFill>
+                <a:schemeClr val="tx1"/>
+              </a:solidFill>
+            </a:endParaRPr>
+          </a:p>
+        </p:txBody>
+      </p:sp>
+      <p:cxnSp>
+        <p:nvCxnSpPr>
+          <p:cNvPr id="223" name="Conector curvado 222"/>
+          <p:cNvCxnSpPr>
+            <a:stCxn id="220" idx="3"/>
+            <a:endCxn id="221" idx="1"/>
+          </p:cNvCxnSpPr>
+          <p:nvPr/>
+        </p:nvCxnSpPr>
+        <p:spPr>
+          <a:xfrm flipV="1">
+            <a:off x="5153163" y="3521077"/>
+            <a:ext cx="599650" cy="250395"/>
+          </a:xfrm>
+          <a:prstGeom prst="curvedConnector3">
+            <a:avLst>
+              <a:gd name="adj1" fmla="val 50000"/>
+            </a:avLst>
+          </a:prstGeom>
+          <a:ln w="12700">
+            <a:solidFill>
+              <a:schemeClr val="tx1"/>
+            </a:solidFill>
+            <a:tailEnd type="triangle"/>
+          </a:ln>
+        </p:spPr>
+        <p:style>
+          <a:lnRef idx="1">
+            <a:schemeClr val="accent1"/>
+          </a:lnRef>
+          <a:fillRef idx="0">
+            <a:schemeClr val="accent1"/>
+          </a:fillRef>
+          <a:effectRef idx="0">
+            <a:schemeClr val="accent1"/>
+          </a:effectRef>
+          <a:fontRef idx="minor">
+            <a:schemeClr val="tx1"/>
+          </a:fontRef>
+        </p:style>
+      </p:cxnSp>
+      <p:cxnSp>
+        <p:nvCxnSpPr>
+          <p:cNvPr id="224" name="Conector curvado 223"/>
+          <p:cNvCxnSpPr>
+            <a:stCxn id="220" idx="3"/>
+            <a:endCxn id="222" idx="1"/>
+          </p:cNvCxnSpPr>
+          <p:nvPr/>
+        </p:nvCxnSpPr>
+        <p:spPr>
+          <a:xfrm>
+            <a:off x="5153163" y="3771472"/>
+            <a:ext cx="708983" cy="265422"/>
+          </a:xfrm>
+          <a:prstGeom prst="curvedConnector3">
+            <a:avLst/>
+          </a:prstGeom>
+          <a:ln w="12700">
+            <a:solidFill>
+              <a:schemeClr val="tx1"/>
+            </a:solidFill>
+            <a:tailEnd type="triangle"/>
+          </a:ln>
+        </p:spPr>
+        <p:style>
+          <a:lnRef idx="1">
+            <a:schemeClr val="accent1"/>
+          </a:lnRef>
+          <a:fillRef idx="0">
+            <a:schemeClr val="accent1"/>
+          </a:fillRef>
+          <a:effectRef idx="0">
+            <a:schemeClr val="accent1"/>
+          </a:effectRef>
+          <a:fontRef idx="minor">
+            <a:schemeClr val="tx1"/>
+          </a:fontRef>
+        </p:style>
+      </p:cxnSp>
+      <p:sp>
+        <p:nvSpPr>
+          <p:cNvPr id="231" name="Rectángulo 230"/>
+          <p:cNvSpPr/>
+          <p:nvPr/>
+        </p:nvSpPr>
+        <p:spPr>
+          <a:xfrm>
+            <a:off x="8572950" y="5640315"/>
+            <a:ext cx="1331390" cy="407773"/>
+          </a:xfrm>
+          <a:prstGeom prst="rect">
+            <a:avLst/>
+          </a:prstGeom>
+          <a:noFill/>
+          <a:ln w="38100">
+            <a:solidFill>
+              <a:schemeClr val="tx1"/>
+            </a:solidFill>
+          </a:ln>
+        </p:spPr>
+        <p:style>
+          <a:lnRef idx="2">
+            <a:schemeClr val="accent1">
+              <a:shade val="50000"/>
+            </a:schemeClr>
+          </a:lnRef>
+          <a:fillRef idx="1">
+            <a:schemeClr val="accent1"/>
+          </a:fillRef>
+          <a:effectRef idx="0">
+            <a:schemeClr val="accent1"/>
+          </a:effectRef>
+          <a:fontRef idx="minor">
+            <a:schemeClr val="lt1"/>
+          </a:fontRef>
+        </p:style>
+        <p:txBody>
+          <a:bodyPr rtlCol="0" anchor="ctr"/>
+          <a:lstStyle/>
+          <a:p>
+            <a:pPr algn="ctr"/>
+            <a:r>
+              <a:rPr lang="es-VE" sz="1400" dirty="0" err="1">
+                <a:solidFill>
+                  <a:schemeClr val="tx1"/>
+                </a:solidFill>
+              </a:rPr>
+              <a:t>a</a:t>
+            </a:r>
+            <a:r>
+              <a:rPr lang="es-VE" sz="1400" dirty="0" err="1" smtClean="0">
+                <a:solidFill>
+                  <a:schemeClr val="tx1"/>
+                </a:solidFill>
+              </a:rPr>
+              <a:t>lias_cantante</a:t>
+            </a:r>
+            <a:endParaRPr lang="es-VE" sz="1400" dirty="0">
+              <a:solidFill>
+                <a:schemeClr val="tx1"/>
+              </a:solidFill>
+            </a:endParaRPr>
+          </a:p>
+        </p:txBody>
+      </p:sp>
+      <p:sp>
+        <p:nvSpPr>
+          <p:cNvPr id="232" name="Rectángulo 231"/>
+          <p:cNvSpPr/>
+          <p:nvPr/>
+        </p:nvSpPr>
+        <p:spPr>
+          <a:xfrm>
+            <a:off x="8682283" y="6156132"/>
+            <a:ext cx="1112724" cy="407773"/>
+          </a:xfrm>
+          <a:prstGeom prst="rect">
+            <a:avLst/>
+          </a:prstGeom>
+          <a:noFill/>
+          <a:ln w="38100">
+            <a:solidFill>
+              <a:schemeClr val="tx1"/>
+            </a:solidFill>
+          </a:ln>
+        </p:spPr>
+        <p:style>
+          <a:lnRef idx="2">
+            <a:schemeClr val="accent1">
+              <a:shade val="50000"/>
+            </a:schemeClr>
+          </a:lnRef>
+          <a:fillRef idx="1">
+            <a:schemeClr val="accent1"/>
+          </a:fillRef>
+          <a:effectRef idx="0">
+            <a:schemeClr val="accent1"/>
+          </a:effectRef>
+          <a:fontRef idx="minor">
+            <a:schemeClr val="lt1"/>
+          </a:fontRef>
+        </p:style>
+        <p:txBody>
+          <a:bodyPr rtlCol="0" anchor="ctr"/>
+          <a:lstStyle/>
+          <a:p>
+            <a:pPr algn="ctr"/>
+            <a:r>
+              <a:rPr lang="es-VE" sz="1400" dirty="0" smtClean="0">
+                <a:solidFill>
+                  <a:schemeClr val="tx1"/>
+                </a:solidFill>
+              </a:rPr>
+              <a:t>nacionalidad</a:t>
+            </a:r>
+            <a:endParaRPr lang="es-VE" sz="1400" dirty="0">
+              <a:solidFill>
+                <a:schemeClr val="tx1"/>
+              </a:solidFill>
+            </a:endParaRPr>
+          </a:p>
+        </p:txBody>
+      </p:sp>
+      <p:sp>
+        <p:nvSpPr>
+          <p:cNvPr id="233" name="Rectángulo 232"/>
+          <p:cNvSpPr/>
+          <p:nvPr/>
+        </p:nvSpPr>
+        <p:spPr>
+          <a:xfrm>
+            <a:off x="10414454" y="5866453"/>
+            <a:ext cx="1396628" cy="407773"/>
+          </a:xfrm>
+          <a:prstGeom prst="rect">
+            <a:avLst/>
+          </a:prstGeom>
+          <a:noFill/>
+          <a:ln w="38100">
+            <a:solidFill>
+              <a:schemeClr val="tx1"/>
+            </a:solidFill>
+          </a:ln>
+        </p:spPr>
+        <p:style>
+          <a:lnRef idx="2">
+            <a:schemeClr val="accent1">
+              <a:shade val="50000"/>
+            </a:schemeClr>
+          </a:lnRef>
+          <a:fillRef idx="1">
+            <a:schemeClr val="accent1"/>
+          </a:fillRef>
+          <a:effectRef idx="0">
+            <a:schemeClr val="accent1"/>
+          </a:effectRef>
+          <a:fontRef idx="minor">
+            <a:schemeClr val="lt1"/>
+          </a:fontRef>
+        </p:style>
+        <p:txBody>
+          <a:bodyPr rtlCol="0" anchor="ctr"/>
+          <a:lstStyle/>
+          <a:p>
+            <a:pPr algn="ctr"/>
+            <a:r>
+              <a:rPr lang="es-VE" sz="1400" dirty="0" err="1" smtClean="0">
+                <a:solidFill>
+                  <a:schemeClr val="tx1"/>
+                </a:solidFill>
+              </a:rPr>
+              <a:t>nombre_real</a:t>
+            </a:r>
+            <a:endParaRPr lang="es-VE" sz="1400" dirty="0">
+              <a:solidFill>
+                <a:schemeClr val="tx1"/>
+              </a:solidFill>
+            </a:endParaRPr>
+          </a:p>
+        </p:txBody>
+      </p:sp>
+      <p:sp>
+        <p:nvSpPr>
+          <p:cNvPr id="234" name="Rectángulo 233"/>
+          <p:cNvSpPr/>
+          <p:nvPr/>
+        </p:nvSpPr>
+        <p:spPr>
+          <a:xfrm>
+            <a:off x="8404388" y="5532271"/>
+            <a:ext cx="1668514" cy="1124491"/>
+          </a:xfrm>
+          <a:prstGeom prst="rect">
+            <a:avLst/>
+          </a:prstGeom>
+          <a:noFill/>
+          <a:ln w="19050">
+            <a:solidFill>
+              <a:schemeClr val="tx1"/>
+            </a:solidFill>
+          </a:ln>
+        </p:spPr>
+        <p:style>
+          <a:lnRef idx="2">
+            <a:schemeClr val="accent1">
+              <a:shade val="50000"/>
+            </a:schemeClr>
+          </a:lnRef>
+          <a:fillRef idx="1">
+            <a:schemeClr val="accent1"/>
+          </a:fillRef>
+          <a:effectRef idx="0">
+            <a:schemeClr val="accent1"/>
+          </a:effectRef>
+          <a:fontRef idx="minor">
+            <a:schemeClr val="lt1"/>
+          </a:fontRef>
+        </p:style>
+        <p:txBody>
+          <a:bodyPr rtlCol="0" anchor="ctr"/>
+          <a:lstStyle/>
+          <a:p>
+            <a:pPr algn="ctr"/>
+            <a:endParaRPr lang="es-VE"/>
+          </a:p>
+        </p:txBody>
+      </p:sp>
+      <p:cxnSp>
+        <p:nvCxnSpPr>
+          <p:cNvPr id="235" name="Conector curvado 234"/>
+          <p:cNvCxnSpPr>
+            <a:stCxn id="234" idx="3"/>
+            <a:endCxn id="233" idx="1"/>
+          </p:cNvCxnSpPr>
+          <p:nvPr/>
+        </p:nvCxnSpPr>
+        <p:spPr>
+          <a:xfrm flipV="1">
+            <a:off x="10072902" y="6070340"/>
+            <a:ext cx="341552" cy="24177"/>
+          </a:xfrm>
+          <a:prstGeom prst="curvedConnector3">
+            <a:avLst>
+              <a:gd name="adj1" fmla="val 50000"/>
+            </a:avLst>
+          </a:prstGeom>
+          <a:ln w="12700">
+            <a:solidFill>
+              <a:schemeClr val="tx1"/>
+            </a:solidFill>
+            <a:tailEnd type="triangle"/>
+          </a:ln>
+        </p:spPr>
+        <p:style>
+          <a:lnRef idx="1">
+            <a:schemeClr val="accent1"/>
+          </a:lnRef>
+          <a:fillRef idx="0">
+            <a:schemeClr val="accent1"/>
+          </a:fillRef>
+          <a:effectRef idx="0">
+            <a:schemeClr val="accent1"/>
+          </a:effectRef>
+          <a:fontRef idx="minor">
+            <a:schemeClr val="tx1"/>
+          </a:fontRef>
+        </p:style>
+      </p:cxnSp>
+      <p:sp>
+        <p:nvSpPr>
+          <p:cNvPr id="247" name="Rectángulo 246"/>
+          <p:cNvSpPr/>
+          <p:nvPr/>
+        </p:nvSpPr>
+        <p:spPr>
+          <a:xfrm>
+            <a:off x="586190" y="3866401"/>
+            <a:ext cx="877330" cy="407773"/>
+          </a:xfrm>
+          <a:prstGeom prst="rect">
+            <a:avLst/>
+          </a:prstGeom>
+          <a:noFill/>
+          <a:ln w="38100">
+            <a:solidFill>
+              <a:schemeClr val="tx1"/>
+            </a:solidFill>
+          </a:ln>
+        </p:spPr>
+        <p:style>
+          <a:lnRef idx="2">
+            <a:schemeClr val="accent1">
+              <a:shade val="50000"/>
+            </a:schemeClr>
+          </a:lnRef>
+          <a:fillRef idx="1">
+            <a:schemeClr val="accent1"/>
+          </a:fillRef>
+          <a:effectRef idx="0">
+            <a:schemeClr val="accent1"/>
+          </a:effectRef>
+          <a:fontRef idx="minor">
+            <a:schemeClr val="lt1"/>
+          </a:fontRef>
+        </p:style>
+        <p:txBody>
+          <a:bodyPr rtlCol="0" anchor="ctr"/>
+          <a:lstStyle/>
+          <a:p>
+            <a:pPr algn="ctr"/>
+            <a:r>
+              <a:rPr lang="es-VE" sz="1400" dirty="0" smtClean="0">
+                <a:solidFill>
+                  <a:schemeClr val="tx1"/>
+                </a:solidFill>
+              </a:rPr>
+              <a:t>lugar</a:t>
+            </a:r>
+            <a:endParaRPr lang="es-VE" sz="1400" dirty="0">
+              <a:solidFill>
+                <a:schemeClr val="tx1"/>
+              </a:solidFill>
+            </a:endParaRPr>
+          </a:p>
+        </p:txBody>
+      </p:sp>
+      <p:sp>
+        <p:nvSpPr>
+          <p:cNvPr id="249" name="Rectángulo 248"/>
+          <p:cNvSpPr/>
+          <p:nvPr/>
+        </p:nvSpPr>
+        <p:spPr>
+          <a:xfrm>
+            <a:off x="1855630" y="3866402"/>
+            <a:ext cx="1099294" cy="407773"/>
+          </a:xfrm>
+          <a:prstGeom prst="rect">
+            <a:avLst/>
+          </a:prstGeom>
+          <a:noFill/>
+          <a:ln w="38100">
+            <a:solidFill>
+              <a:schemeClr val="tx1"/>
+            </a:solidFill>
+          </a:ln>
+        </p:spPr>
+        <p:style>
+          <a:lnRef idx="2">
+            <a:schemeClr val="accent1">
+              <a:shade val="50000"/>
+            </a:schemeClr>
+          </a:lnRef>
+          <a:fillRef idx="1">
+            <a:schemeClr val="accent1"/>
+          </a:fillRef>
+          <a:effectRef idx="0">
+            <a:schemeClr val="accent1"/>
+          </a:effectRef>
+          <a:fontRef idx="minor">
+            <a:schemeClr val="lt1"/>
+          </a:fontRef>
+        </p:style>
+        <p:txBody>
+          <a:bodyPr rtlCol="0" anchor="ctr"/>
+          <a:lstStyle/>
+          <a:p>
+            <a:pPr algn="ctr"/>
+            <a:r>
+              <a:rPr lang="es-VE" sz="1400" dirty="0" smtClean="0">
+                <a:solidFill>
+                  <a:schemeClr val="tx1"/>
+                </a:solidFill>
+              </a:rPr>
+              <a:t>repertorio</a:t>
+            </a:r>
+            <a:endParaRPr lang="es-VE" sz="1400" dirty="0">
+              <a:solidFill>
+                <a:schemeClr val="tx1"/>
+              </a:solidFill>
+            </a:endParaRPr>
+          </a:p>
+        </p:txBody>
+      </p:sp>
+      <p:cxnSp>
+        <p:nvCxnSpPr>
+          <p:cNvPr id="251" name="Conector curvado 250"/>
+          <p:cNvCxnSpPr>
+            <a:stCxn id="247" idx="3"/>
+            <a:endCxn id="249" idx="1"/>
+          </p:cNvCxnSpPr>
+          <p:nvPr/>
+        </p:nvCxnSpPr>
+        <p:spPr>
+          <a:xfrm>
+            <a:off x="1463520" y="4070288"/>
+            <a:ext cx="392110" cy="1"/>
+          </a:xfrm>
+          <a:prstGeom prst="curvedConnector3">
+            <a:avLst>
+              <a:gd name="adj1" fmla="val 50000"/>
+            </a:avLst>
+          </a:prstGeom>
+          <a:ln w="12700">
+            <a:solidFill>
+              <a:schemeClr val="tx1"/>
+            </a:solidFill>
+            <a:tailEnd type="triangle"/>
+          </a:ln>
+        </p:spPr>
+        <p:style>
+          <a:lnRef idx="1">
+            <a:schemeClr val="accent1"/>
+          </a:lnRef>
+          <a:fillRef idx="0">
+            <a:schemeClr val="accent1"/>
+          </a:fillRef>
+          <a:effectRef idx="0">
+            <a:schemeClr val="accent1"/>
+          </a:effectRef>
+          <a:fontRef idx="minor">
+            <a:schemeClr val="tx1"/>
+          </a:fontRef>
+        </p:style>
+      </p:cxnSp>
+      <p:sp>
+        <p:nvSpPr>
+          <p:cNvPr id="255" name="Rectángulo 254"/>
+          <p:cNvSpPr/>
+          <p:nvPr/>
+        </p:nvSpPr>
+        <p:spPr>
+          <a:xfrm>
+            <a:off x="765323" y="5295551"/>
+            <a:ext cx="1983308" cy="1257299"/>
+          </a:xfrm>
+          <a:prstGeom prst="rect">
+            <a:avLst/>
+          </a:prstGeom>
+          <a:noFill/>
+          <a:ln w="19050">
+            <a:solidFill>
+              <a:schemeClr val="tx1"/>
+            </a:solidFill>
+          </a:ln>
+        </p:spPr>
+        <p:style>
+          <a:lnRef idx="2">
+            <a:schemeClr val="accent1">
+              <a:shade val="50000"/>
+            </a:schemeClr>
+          </a:lnRef>
+          <a:fillRef idx="1">
+            <a:schemeClr val="accent1"/>
+          </a:fillRef>
+          <a:effectRef idx="0">
+            <a:schemeClr val="accent1"/>
+          </a:effectRef>
+          <a:fontRef idx="minor">
+            <a:schemeClr val="lt1"/>
+          </a:fontRef>
+        </p:style>
+        <p:txBody>
+          <a:bodyPr rtlCol="0" anchor="ctr"/>
+          <a:lstStyle/>
+          <a:p>
+            <a:pPr algn="ctr"/>
+            <a:endParaRPr lang="es-VE" dirty="0"/>
+          </a:p>
+        </p:txBody>
+      </p:sp>
+      <p:sp>
+        <p:nvSpPr>
+          <p:cNvPr id="256" name="Rectángulo 255"/>
+          <p:cNvSpPr/>
+          <p:nvPr/>
+        </p:nvSpPr>
+        <p:spPr>
+          <a:xfrm>
+            <a:off x="879648" y="5997826"/>
+            <a:ext cx="1754658" cy="407773"/>
+          </a:xfrm>
+          <a:prstGeom prst="rect">
+            <a:avLst/>
+          </a:prstGeom>
+          <a:noFill/>
+          <a:ln w="38100">
+            <a:solidFill>
+              <a:schemeClr val="tx1"/>
+            </a:solidFill>
+          </a:ln>
+        </p:spPr>
+        <p:style>
+          <a:lnRef idx="2">
+            <a:schemeClr val="accent1">
+              <a:shade val="50000"/>
+            </a:schemeClr>
+          </a:lnRef>
+          <a:fillRef idx="1">
+            <a:schemeClr val="accent1"/>
+          </a:fillRef>
+          <a:effectRef idx="0">
+            <a:schemeClr val="accent1"/>
+          </a:effectRef>
+          <a:fontRef idx="minor">
+            <a:schemeClr val="lt1"/>
+          </a:fontRef>
+        </p:style>
+        <p:txBody>
+          <a:bodyPr rtlCol="0" anchor="ctr"/>
+          <a:lstStyle/>
+          <a:p>
+            <a:pPr algn="ctr"/>
+            <a:r>
+              <a:rPr lang="es-VE" sz="1400" dirty="0" err="1">
+                <a:solidFill>
+                  <a:schemeClr val="tx1"/>
+                </a:solidFill>
+              </a:rPr>
+              <a:t>f</a:t>
+            </a:r>
+            <a:r>
+              <a:rPr lang="es-VE" sz="1400" dirty="0" err="1" smtClean="0">
+                <a:solidFill>
+                  <a:schemeClr val="tx1"/>
+                </a:solidFill>
+              </a:rPr>
+              <a:t>echa_presentacion</a:t>
+            </a:r>
+            <a:endParaRPr lang="es-VE" sz="1400" dirty="0">
+              <a:solidFill>
+                <a:schemeClr val="tx1"/>
+              </a:solidFill>
+            </a:endParaRPr>
+          </a:p>
+        </p:txBody>
+      </p:sp>
+      <p:sp>
+        <p:nvSpPr>
+          <p:cNvPr id="257" name="Rectángulo 256"/>
+          <p:cNvSpPr/>
+          <p:nvPr/>
+        </p:nvSpPr>
+        <p:spPr>
+          <a:xfrm>
+            <a:off x="1007001" y="5442802"/>
+            <a:ext cx="1499952" cy="407773"/>
+          </a:xfrm>
+          <a:prstGeom prst="rect">
+            <a:avLst/>
+          </a:prstGeom>
+          <a:noFill/>
+          <a:ln w="38100">
+            <a:solidFill>
+              <a:schemeClr val="tx1"/>
+            </a:solidFill>
+          </a:ln>
+        </p:spPr>
+        <p:style>
+          <a:lnRef idx="2">
+            <a:schemeClr val="accent1">
+              <a:shade val="50000"/>
+            </a:schemeClr>
+          </a:lnRef>
+          <a:fillRef idx="1">
+            <a:schemeClr val="accent1"/>
+          </a:fillRef>
+          <a:effectRef idx="0">
+            <a:schemeClr val="accent1"/>
+          </a:effectRef>
+          <a:fontRef idx="minor">
+            <a:schemeClr val="lt1"/>
+          </a:fontRef>
+        </p:style>
+        <p:txBody>
+          <a:bodyPr rtlCol="0" anchor="ctr"/>
+          <a:lstStyle/>
+          <a:p>
+            <a:pPr algn="ctr"/>
+            <a:r>
+              <a:rPr lang="es-VE" sz="1400" dirty="0" err="1">
+                <a:solidFill>
+                  <a:schemeClr val="tx1"/>
+                </a:solidFill>
+              </a:rPr>
+              <a:t>c</a:t>
+            </a:r>
+            <a:r>
+              <a:rPr lang="es-VE" sz="1400" dirty="0" err="1" smtClean="0">
+                <a:solidFill>
+                  <a:schemeClr val="tx1"/>
+                </a:solidFill>
+              </a:rPr>
+              <a:t>odigo_cantante</a:t>
+            </a:r>
+            <a:endParaRPr lang="es-VE" sz="1400" dirty="0">
+              <a:solidFill>
+                <a:schemeClr val="tx1"/>
+              </a:solidFill>
+            </a:endParaRPr>
+          </a:p>
+        </p:txBody>
+      </p:sp>
+      <p:sp>
+        <p:nvSpPr>
+          <p:cNvPr id="258" name="Rectángulo 257"/>
+          <p:cNvSpPr/>
+          <p:nvPr/>
+        </p:nvSpPr>
+        <p:spPr>
+          <a:xfrm>
+            <a:off x="3301986" y="5656989"/>
+            <a:ext cx="877330" cy="407773"/>
+          </a:xfrm>
+          <a:prstGeom prst="rect">
+            <a:avLst/>
+          </a:prstGeom>
+          <a:noFill/>
+          <a:ln w="38100">
+            <a:solidFill>
+              <a:schemeClr val="tx1"/>
+            </a:solidFill>
+          </a:ln>
+        </p:spPr>
+        <p:style>
+          <a:lnRef idx="2">
+            <a:schemeClr val="accent1">
+              <a:shade val="50000"/>
+            </a:schemeClr>
+          </a:lnRef>
+          <a:fillRef idx="1">
+            <a:schemeClr val="accent1"/>
+          </a:fillRef>
+          <a:effectRef idx="0">
+            <a:schemeClr val="accent1"/>
+          </a:effectRef>
+          <a:fontRef idx="minor">
+            <a:schemeClr val="lt1"/>
+          </a:fontRef>
+        </p:style>
+        <p:txBody>
+          <a:bodyPr rtlCol="0" anchor="ctr"/>
+          <a:lstStyle/>
+          <a:p>
+            <a:pPr algn="ctr"/>
+            <a:r>
+              <a:rPr lang="es-VE" sz="1400" dirty="0" smtClean="0">
+                <a:solidFill>
+                  <a:schemeClr val="tx1"/>
+                </a:solidFill>
+              </a:rPr>
+              <a:t>lugar</a:t>
+            </a:r>
+            <a:endParaRPr lang="es-VE" sz="1400" dirty="0">
+              <a:solidFill>
+                <a:schemeClr val="tx1"/>
+              </a:solidFill>
+            </a:endParaRPr>
+          </a:p>
+        </p:txBody>
+      </p:sp>
+      <p:cxnSp>
+        <p:nvCxnSpPr>
+          <p:cNvPr id="259" name="Conector curvado 258"/>
+          <p:cNvCxnSpPr>
+            <a:stCxn id="255" idx="3"/>
+            <a:endCxn id="258" idx="1"/>
+          </p:cNvCxnSpPr>
+          <p:nvPr/>
+        </p:nvCxnSpPr>
+        <p:spPr>
+          <a:xfrm flipV="1">
+            <a:off x="2748631" y="5860876"/>
+            <a:ext cx="553355" cy="63325"/>
+          </a:xfrm>
+          <a:prstGeom prst="curvedConnector3">
+            <a:avLst>
+              <a:gd name="adj1" fmla="val 50000"/>
+            </a:avLst>
+          </a:prstGeom>
+          <a:ln w="12700">
+            <a:solidFill>
+              <a:schemeClr val="tx1"/>
+            </a:solidFill>
+            <a:tailEnd type="triangle"/>
+          </a:ln>
+        </p:spPr>
+        <p:style>
+          <a:lnRef idx="1">
+            <a:schemeClr val="accent1"/>
+          </a:lnRef>
+          <a:fillRef idx="0">
+            <a:schemeClr val="accent1"/>
+          </a:fillRef>
+          <a:effectRef idx="0">
+            <a:schemeClr val="accent1"/>
+          </a:effectRef>
+          <a:fontRef idx="minor">
+            <a:schemeClr val="tx1"/>
+          </a:fontRef>
+        </p:style>
+      </p:cxnSp>
+    </p:spTree>
+    <p:extLst>
+      <p:ext uri="{BB962C8B-B14F-4D97-AF65-F5344CB8AC3E}">
+        <p14:creationId xmlns:p14="http://schemas.microsoft.com/office/powerpoint/2010/main" val="2496976290"/>
       </p:ext>
     </p:extLst>
   </p:cSld>

</xml_diff>